<commit_message>
Revise the presentation slides
</commit_message>
<xml_diff>
--- a/Producer and Consumer in Java - Advanced Topic.pptx
+++ b/Producer and Consumer in Java - Advanced Topic.pptx
@@ -5,13 +5,13 @@
     <p:sldMasterId id="2147483660" r:id="rId1"/>
   </p:sldMasterIdLst>
   <p:notesMasterIdLst>
-    <p:notesMasterId r:id="rId12"/>
+    <p:notesMasterId r:id="rId11"/>
   </p:notesMasterIdLst>
   <p:handoutMasterIdLst>
-    <p:handoutMasterId r:id="rId13"/>
+    <p:handoutMasterId r:id="rId12"/>
   </p:handoutMasterIdLst>
   <p:sldIdLst>
-    <p:sldId id="259" r:id="rId2"/>
+    <p:sldId id="324" r:id="rId2"/>
     <p:sldId id="322" r:id="rId3"/>
     <p:sldId id="277" r:id="rId4"/>
     <p:sldId id="321" r:id="rId5"/>
@@ -20,28 +20,22 @@
     <p:sldId id="307" r:id="rId8"/>
     <p:sldId id="308" r:id="rId9"/>
     <p:sldId id="261" r:id="rId10"/>
-    <p:sldId id="281" r:id="rId11"/>
   </p:sldIdLst>
   <p:sldSz cx="12192000" cy="6858000"/>
   <p:notesSz cx="6858000" cy="9144000"/>
   <p:embeddedFontLst>
     <p:embeddedFont>
       <p:font typeface="Ericsson Hilda" panose="00000500000000000000" pitchFamily="2" charset="0"/>
-      <p:regular r:id="rId14"/>
-      <p:bold r:id="rId15"/>
+      <p:regular r:id="rId13"/>
+      <p:bold r:id="rId14"/>
     </p:embeddedFont>
     <p:embeddedFont>
       <p:font typeface="Ericsson Hilda Light" panose="00000400000000000000" pitchFamily="2" charset="0"/>
-      <p:regular r:id="rId16"/>
+      <p:regular r:id="rId15"/>
     </p:embeddedFont>
     <p:embeddedFont>
       <p:font typeface="Ericsson Technical Icons" panose="00000500000000000000" pitchFamily="2" charset="0"/>
-      <p:regular r:id="rId17"/>
-    </p:embeddedFont>
-    <p:embeddedFont>
-      <p:font typeface="等线" panose="02010600030101010101" pitchFamily="2" charset="-122"/>
-      <p:regular r:id="rId18"/>
-      <p:bold r:id="rId19"/>
+      <p:regular r:id="rId16"/>
     </p:embeddedFont>
   </p:embeddedFontLst>
   <p:defaultTextStyle>
@@ -1385,97 +1379,6 @@
               <a:tabLst/>
               <a:defRPr/>
             </a:pPr>
-            <a:r>
-              <a:rPr lang="zh-CN" altLang="en-US" sz="1200" dirty="0"/>
-              <a:t>并发模式：</a:t>
-            </a:r>
-            <a:endParaRPr lang="en-US" altLang="zh-CN" sz="1200" dirty="0"/>
-          </a:p>
-          <a:p>
-            <a:pPr marL="0" marR="0" lvl="0" indent="0" algn="l" defTabSz="914400" rtl="0" eaLnBrk="1" fontAlgn="auto" latinLnBrk="0" hangingPunct="1">
-              <a:lnSpc>
-                <a:spcPct val="100000"/>
-              </a:lnSpc>
-              <a:spcBef>
-                <a:spcPts val="0"/>
-              </a:spcBef>
-              <a:spcAft>
-                <a:spcPts val="0"/>
-              </a:spcAft>
-              <a:buClrTx/>
-              <a:buSzTx/>
-              <a:buFontTx/>
-              <a:buNone/>
-              <a:tabLst/>
-              <a:defRPr/>
-            </a:pPr>
-            <a:r>
-              <a:rPr lang="en-US" sz="1200" dirty="0"/>
-              <a:t>- Actor</a:t>
-            </a:r>
-            <a:r>
-              <a:rPr lang="zh-CN" altLang="en-US" sz="1200" dirty="0"/>
-              <a:t>模型</a:t>
-            </a:r>
-            <a:r>
-              <a:rPr lang="en-US" sz="1200" dirty="0"/>
-              <a:t> Erlang, Scala, Java </a:t>
-            </a:r>
-            <a:r>
-              <a:rPr lang="en-US" sz="1200" dirty="0" err="1"/>
-              <a:t>Akka</a:t>
-            </a:r>
-            <a:endParaRPr lang="en-US" sz="1200" dirty="0"/>
-          </a:p>
-          <a:p>
-            <a:r>
-              <a:rPr lang="en-US" sz="1200" b="0" i="0" kern="1200" dirty="0">
-                <a:solidFill>
-                  <a:schemeClr val="tx1"/>
-                </a:solidFill>
-                <a:effectLst/>
-                <a:latin typeface="Ericsson Hilda Light" panose="00000400000000000000" pitchFamily="2" charset="0"/>
-                <a:ea typeface="+mn-ea"/>
-                <a:cs typeface="+mn-cs"/>
-              </a:rPr>
-              <a:t>- CSP(Communicating Sequential Process)</a:t>
-            </a:r>
-            <a:r>
-              <a:rPr lang="en-US" sz="1200" b="0" i="0" kern="1200" dirty="0" err="1">
-                <a:solidFill>
-                  <a:schemeClr val="tx1"/>
-                </a:solidFill>
-                <a:effectLst/>
-                <a:latin typeface="Ericsson Hilda Light" panose="00000400000000000000" pitchFamily="2" charset="0"/>
-                <a:ea typeface="+mn-ea"/>
-                <a:cs typeface="+mn-cs"/>
-              </a:rPr>
-              <a:t>模型</a:t>
-            </a:r>
-            <a:r>
-              <a:rPr lang="en-US" sz="1200" b="0" i="0" kern="1200" dirty="0">
-                <a:solidFill>
-                  <a:schemeClr val="tx1"/>
-                </a:solidFill>
-                <a:effectLst/>
-                <a:latin typeface="Ericsson Hilda Light" panose="00000400000000000000" pitchFamily="2" charset="0"/>
-                <a:ea typeface="+mn-ea"/>
-                <a:cs typeface="+mn-cs"/>
-              </a:rPr>
-              <a:t>： </a:t>
-            </a:r>
-            <a:r>
-              <a:rPr lang="en-US" sz="1200" b="0" i="0" kern="1200" dirty="0" err="1">
-                <a:solidFill>
-                  <a:schemeClr val="tx1"/>
-                </a:solidFill>
-                <a:effectLst/>
-                <a:latin typeface="Ericsson Hilda Light" panose="00000400000000000000" pitchFamily="2" charset="0"/>
-                <a:ea typeface="+mn-ea"/>
-                <a:cs typeface="+mn-cs"/>
-              </a:rPr>
-              <a:t>golang</a:t>
-            </a:r>
             <a:endParaRPr lang="en-US" dirty="0"/>
           </a:p>
         </p:txBody>
@@ -1730,268 +1633,6 @@
     <p:extLst>
       <p:ext uri="{BB962C8B-B14F-4D97-AF65-F5344CB8AC3E}">
         <p14:creationId xmlns:p14="http://schemas.microsoft.com/office/powerpoint/2010/main" val="2799822949"/>
-      </p:ext>
-    </p:extLst>
-  </p:cSld>
-  <p:clrMapOvr>
-    <a:masterClrMapping/>
-  </p:clrMapOvr>
-</p:notes>
-</file>
-
-<file path=ppt/notesSlides/notesSlide7.xml><?xml version="1.0" encoding="utf-8"?>
-<p:notes xmlns:a="http://schemas.openxmlformats.org/drawingml/2006/main" xmlns:r="http://schemas.openxmlformats.org/officeDocument/2006/relationships" xmlns:p="http://schemas.openxmlformats.org/presentationml/2006/main">
-  <p:cSld>
-    <p:spTree>
-      <p:nvGrpSpPr>
-        <p:cNvPr id="1" name=""/>
-        <p:cNvGrpSpPr/>
-        <p:nvPr/>
-      </p:nvGrpSpPr>
-      <p:grpSpPr>
-        <a:xfrm>
-          <a:off x="0" y="0"/>
-          <a:ext cx="0" cy="0"/>
-          <a:chOff x="0" y="0"/>
-          <a:chExt cx="0" cy="0"/>
-        </a:xfrm>
-      </p:grpSpPr>
-      <p:sp>
-        <p:nvSpPr>
-          <p:cNvPr id="2" name="Slide Image Placeholder 1"/>
-          <p:cNvSpPr>
-            <a:spLocks noGrp="1" noRot="1" noChangeAspect="1"/>
-          </p:cNvSpPr>
-          <p:nvPr>
-            <p:ph type="sldImg"/>
-          </p:nvPr>
-        </p:nvSpPr>
-        <p:spPr/>
-      </p:sp>
-      <p:sp>
-        <p:nvSpPr>
-          <p:cNvPr id="3" name="Notes Placeholder 2"/>
-          <p:cNvSpPr>
-            <a:spLocks noGrp="1"/>
-          </p:cNvSpPr>
-          <p:nvPr>
-            <p:ph type="body" idx="1"/>
-          </p:nvPr>
-        </p:nvSpPr>
-        <p:spPr/>
-        <p:txBody>
-          <a:bodyPr/>
-          <a:lstStyle/>
-          <a:p>
-            <a:pPr marL="0" marR="0" lvl="0" indent="0" algn="l" defTabSz="914400" rtl="0" eaLnBrk="1" fontAlgn="auto" latinLnBrk="0" hangingPunct="1">
-              <a:lnSpc>
-                <a:spcPct val="100000"/>
-              </a:lnSpc>
-              <a:spcBef>
-                <a:spcPts val="0"/>
-              </a:spcBef>
-              <a:spcAft>
-                <a:spcPts val="0"/>
-              </a:spcAft>
-              <a:buClrTx/>
-              <a:buSzTx/>
-              <a:buFontTx/>
-              <a:buNone/>
-              <a:tabLst/>
-              <a:defRPr/>
-            </a:pPr>
-            <a:r>
-              <a:rPr lang="zh-CN" altLang="en-US" sz="1200" dirty="0"/>
-              <a:t>并发模式：</a:t>
-            </a:r>
-            <a:endParaRPr lang="en-US" altLang="zh-CN" sz="1200" dirty="0"/>
-          </a:p>
-          <a:p>
-            <a:pPr marL="0" marR="0" lvl="0" indent="0" algn="l" defTabSz="914400" rtl="0" eaLnBrk="1" fontAlgn="auto" latinLnBrk="0" hangingPunct="1">
-              <a:lnSpc>
-                <a:spcPct val="100000"/>
-              </a:lnSpc>
-              <a:spcBef>
-                <a:spcPts val="0"/>
-              </a:spcBef>
-              <a:spcAft>
-                <a:spcPts val="0"/>
-              </a:spcAft>
-              <a:buClrTx/>
-              <a:buSzTx/>
-              <a:buFontTx/>
-              <a:buNone/>
-              <a:tabLst/>
-              <a:defRPr/>
-            </a:pPr>
-            <a:r>
-              <a:rPr lang="en-US" sz="1200" dirty="0"/>
-              <a:t>- Actor</a:t>
-            </a:r>
-            <a:r>
-              <a:rPr lang="zh-CN" altLang="en-US" sz="1200" dirty="0"/>
-              <a:t>模型</a:t>
-            </a:r>
-            <a:r>
-              <a:rPr lang="en-US" sz="1200" dirty="0"/>
-              <a:t> Erlang, Scala, Java </a:t>
-            </a:r>
-            <a:r>
-              <a:rPr lang="en-US" sz="1200" dirty="0" err="1"/>
-              <a:t>Akka</a:t>
-            </a:r>
-            <a:endParaRPr lang="en-US" sz="1200" dirty="0"/>
-          </a:p>
-          <a:p>
-            <a:r>
-              <a:rPr lang="en-US" sz="1200" b="0" i="0" kern="1200" dirty="0">
-                <a:solidFill>
-                  <a:schemeClr val="tx1"/>
-                </a:solidFill>
-                <a:effectLst/>
-                <a:latin typeface="Ericsson Hilda Light" panose="00000400000000000000" pitchFamily="2" charset="0"/>
-                <a:ea typeface="+mn-ea"/>
-                <a:cs typeface="+mn-cs"/>
-              </a:rPr>
-              <a:t>- CSP(Communicating Sequential Process)</a:t>
-            </a:r>
-            <a:r>
-              <a:rPr lang="en-US" sz="1200" b="0" i="0" kern="1200" dirty="0" err="1">
-                <a:solidFill>
-                  <a:schemeClr val="tx1"/>
-                </a:solidFill>
-                <a:effectLst/>
-                <a:latin typeface="Ericsson Hilda Light" panose="00000400000000000000" pitchFamily="2" charset="0"/>
-                <a:ea typeface="+mn-ea"/>
-                <a:cs typeface="+mn-cs"/>
-              </a:rPr>
-              <a:t>模型</a:t>
-            </a:r>
-            <a:r>
-              <a:rPr lang="en-US" sz="1200" b="0" i="0" kern="1200" dirty="0">
-                <a:solidFill>
-                  <a:schemeClr val="tx1"/>
-                </a:solidFill>
-                <a:effectLst/>
-                <a:latin typeface="Ericsson Hilda Light" panose="00000400000000000000" pitchFamily="2" charset="0"/>
-                <a:ea typeface="+mn-ea"/>
-                <a:cs typeface="+mn-cs"/>
-              </a:rPr>
-              <a:t>： </a:t>
-            </a:r>
-            <a:r>
-              <a:rPr lang="en-US" sz="1200" b="0" i="0" kern="1200" dirty="0" err="1">
-                <a:solidFill>
-                  <a:schemeClr val="tx1"/>
-                </a:solidFill>
-                <a:effectLst/>
-                <a:latin typeface="Ericsson Hilda Light" panose="00000400000000000000" pitchFamily="2" charset="0"/>
-                <a:ea typeface="+mn-ea"/>
-                <a:cs typeface="+mn-cs"/>
-              </a:rPr>
-              <a:t>golang</a:t>
-            </a:r>
-            <a:endParaRPr lang="en-US" dirty="0"/>
-          </a:p>
-        </p:txBody>
-      </p:sp>
-      <p:sp>
-        <p:nvSpPr>
-          <p:cNvPr id="4" name="Header Placeholder 3"/>
-          <p:cNvSpPr>
-            <a:spLocks noGrp="1"/>
-          </p:cNvSpPr>
-          <p:nvPr>
-            <p:ph type="hdr" sz="quarter" idx="10"/>
-          </p:nvPr>
-        </p:nvSpPr>
-        <p:spPr/>
-        <p:txBody>
-          <a:bodyPr/>
-          <a:lstStyle/>
-          <a:p>
-            <a:r>
-              <a:rPr lang="en-US"/>
-              <a:t> </a:t>
-            </a:r>
-            <a:endParaRPr lang="en-US" dirty="0"/>
-          </a:p>
-        </p:txBody>
-      </p:sp>
-      <p:sp>
-        <p:nvSpPr>
-          <p:cNvPr id="5" name="Date Placeholder 4"/>
-          <p:cNvSpPr>
-            <a:spLocks noGrp="1"/>
-          </p:cNvSpPr>
-          <p:nvPr>
-            <p:ph type="dt" idx="11"/>
-          </p:nvPr>
-        </p:nvSpPr>
-        <p:spPr/>
-        <p:txBody>
-          <a:bodyPr/>
-          <a:lstStyle/>
-          <a:p>
-            <a:r>
-              <a:rPr lang="en-US"/>
-              <a:t>2018-02-21 </a:t>
-            </a:r>
-            <a:endParaRPr lang="en-US" dirty="0"/>
-          </a:p>
-        </p:txBody>
-      </p:sp>
-      <p:sp>
-        <p:nvSpPr>
-          <p:cNvPr id="6" name="Footer Placeholder 5"/>
-          <p:cNvSpPr>
-            <a:spLocks noGrp="1"/>
-          </p:cNvSpPr>
-          <p:nvPr>
-            <p:ph type="ftr" sz="quarter" idx="12"/>
-          </p:nvPr>
-        </p:nvSpPr>
-        <p:spPr/>
-        <p:txBody>
-          <a:bodyPr/>
-          <a:lstStyle/>
-          <a:p>
-            <a:r>
-              <a:rPr lang="en-US"/>
-              <a:t> </a:t>
-            </a:r>
-            <a:endParaRPr lang="en-US" dirty="0"/>
-          </a:p>
-        </p:txBody>
-      </p:sp>
-      <p:sp>
-        <p:nvSpPr>
-          <p:cNvPr id="7" name="Slide Number Placeholder 6"/>
-          <p:cNvSpPr>
-            <a:spLocks noGrp="1"/>
-          </p:cNvSpPr>
-          <p:nvPr>
-            <p:ph type="sldNum" sz="quarter" idx="13"/>
-          </p:nvPr>
-        </p:nvSpPr>
-        <p:spPr/>
-        <p:txBody>
-          <a:bodyPr/>
-          <a:lstStyle/>
-          <a:p>
-            <a:fld id="{F949BC75-2359-4F98-918A-7033C92AD487}" type="slidenum">
-              <a:rPr lang="en-US" smtClean="0"/>
-              <a:pPr/>
-              <a:t>10</a:t>
-            </a:fld>
-            <a:endParaRPr lang="en-US" dirty="0"/>
-          </a:p>
-        </p:txBody>
-      </p:sp>
-    </p:spTree>
-    <p:extLst>
-      <p:ext uri="{BB962C8B-B14F-4D97-AF65-F5344CB8AC3E}">
-        <p14:creationId xmlns:p14="http://schemas.microsoft.com/office/powerpoint/2010/main" val="3559665457"/>
       </p:ext>
     </p:extLst>
   </p:cSld>
@@ -13857,7 +13498,7 @@
           <a:p>
             <a:r>
               <a:rPr lang="en-US" dirty="0"/>
-              <a:t>Producer and Consumer Problem in Java</a:t>
+              <a:t>Producer and Consumer Problem in Java - Advanced Topics</a:t>
             </a:r>
           </a:p>
         </p:txBody>
@@ -13885,7 +13526,7 @@
           <a:p>
             <a:r>
               <a:rPr lang="en-US" dirty="0"/>
-              <a:t>Java Instructor Committee</a:t>
+              <a:t>Java Instructor Committee(JIC)</a:t>
             </a:r>
           </a:p>
           <a:p>
@@ -13894,7 +13535,7 @@
           <a:p>
             <a:r>
               <a:rPr lang="en-US" dirty="0"/>
-              <a:t>Concurrent Programming Team</a:t>
+              <a:t>Concurrent Programming in Java</a:t>
             </a:r>
           </a:p>
           <a:p>
@@ -14026,1997 +13667,47 @@
           </a:prstGeom>
         </p:spPr>
       </p:pic>
-    </p:spTree>
-    <p:extLst>
-      <p:ext uri="{BB962C8B-B14F-4D97-AF65-F5344CB8AC3E}">
-        <p14:creationId xmlns:p14="http://schemas.microsoft.com/office/powerpoint/2010/main" val="2189475887"/>
-      </p:ext>
-    </p:extLst>
-  </p:cSld>
-  <p:clrMapOvr>
-    <a:masterClrMapping/>
-  </p:clrMapOvr>
-</p:sld>
-</file>
-
-<file path=ppt/slides/slide10.xml><?xml version="1.0" encoding="utf-8"?>
-<p:sld xmlns:a="http://schemas.openxmlformats.org/drawingml/2006/main" xmlns:r="http://schemas.openxmlformats.org/officeDocument/2006/relationships" xmlns:p="http://schemas.openxmlformats.org/presentationml/2006/main">
-  <p:cSld>
-    <p:spTree>
-      <p:nvGrpSpPr>
-        <p:cNvPr id="1" name=""/>
-        <p:cNvGrpSpPr/>
-        <p:nvPr/>
-      </p:nvGrpSpPr>
-      <p:grpSpPr>
-        <a:xfrm>
-          <a:off x="0" y="0"/>
-          <a:ext cx="0" cy="0"/>
-          <a:chOff x="0" y="0"/>
-          <a:chExt cx="0" cy="0"/>
-        </a:xfrm>
-      </p:grpSpPr>
-      <p:sp>
-        <p:nvSpPr>
-          <p:cNvPr id="3" name="Title 2">
+      <p:sp>
+        <p:nvSpPr>
+          <p:cNvPr id="7" name="Rectangle 6">
             <a:extLst>
               <a:ext uri="{FF2B5EF4-FFF2-40B4-BE49-F238E27FC236}">
-                <a16:creationId xmlns:a16="http://schemas.microsoft.com/office/drawing/2014/main" id="{338B9594-0057-417B-8E78-4CC916B322A3}"/>
-              </a:ext>
-            </a:extLst>
-          </p:cNvPr>
-          <p:cNvSpPr>
-            <a:spLocks noGrp="1"/>
-          </p:cNvSpPr>
-          <p:nvPr>
-            <p:ph type="title"/>
-          </p:nvPr>
-        </p:nvSpPr>
-        <p:spPr/>
-        <p:txBody>
-          <a:bodyPr/>
-          <a:lstStyle/>
-          <a:p>
-            <a:r>
-              <a:rPr lang="zh-CN" altLang="en-US" dirty="0"/>
-              <a:t>生产者</a:t>
-            </a:r>
-            <a:r>
-              <a:rPr lang="en-US" altLang="zh-CN" dirty="0"/>
-              <a:t>/</a:t>
-            </a:r>
-            <a:r>
-              <a:rPr lang="zh-CN" altLang="en-US" dirty="0"/>
-              <a:t>消费者问题</a:t>
-            </a:r>
-            <a:br>
-              <a:rPr lang="en-US" altLang="zh-CN" dirty="0"/>
-            </a:br>
-            <a:r>
-              <a:rPr lang="zh-CN" altLang="en-US" dirty="0"/>
-              <a:t>更高级话题</a:t>
-            </a:r>
-            <a:br>
-              <a:rPr lang="en-US" altLang="zh-CN" dirty="0"/>
-            </a:br>
-            <a:endParaRPr lang="en-US" dirty="0"/>
-          </a:p>
-        </p:txBody>
-      </p:sp>
-      <p:cxnSp>
-        <p:nvCxnSpPr>
-          <p:cNvPr id="8" name="Straight Connector 7">
-            <a:extLst>
-              <a:ext uri="{FF2B5EF4-FFF2-40B4-BE49-F238E27FC236}">
-                <a16:creationId xmlns:a16="http://schemas.microsoft.com/office/drawing/2014/main" id="{91C99860-9EA6-4AC9-8523-6ECDD061B6F1}"/>
-              </a:ext>
-            </a:extLst>
-          </p:cNvPr>
-          <p:cNvCxnSpPr>
-            <a:cxnSpLocks/>
-            <a:stCxn id="14" idx="7"/>
-          </p:cNvCxnSpPr>
-          <p:nvPr/>
-        </p:nvCxnSpPr>
-        <p:spPr bwMode="auto">
-          <a:xfrm flipV="1">
-            <a:off x="5482594" y="1684617"/>
-            <a:ext cx="2293812" cy="1933793"/>
-          </a:xfrm>
-          <a:prstGeom prst="line">
-            <a:avLst/>
-          </a:prstGeom>
-          <a:solidFill>
-            <a:schemeClr val="accent1"/>
-          </a:solidFill>
-          <a:ln w="12700" cap="flat" cmpd="sng" algn="ctr">
-            <a:solidFill>
-              <a:schemeClr val="tx1"/>
-            </a:solidFill>
-            <a:prstDash val="solid"/>
-            <a:round/>
-            <a:headEnd type="none" w="med" len="med"/>
-            <a:tailEnd type="none"/>
-          </a:ln>
-          <a:effectLst/>
-        </p:spPr>
-      </p:cxnSp>
-      <p:cxnSp>
-        <p:nvCxnSpPr>
-          <p:cNvPr id="10" name="Straight Connector 9">
-            <a:extLst>
-              <a:ext uri="{FF2B5EF4-FFF2-40B4-BE49-F238E27FC236}">
-                <a16:creationId xmlns:a16="http://schemas.microsoft.com/office/drawing/2014/main" id="{B0ADCF07-9938-4F50-AECF-9740FBE0CFAC}"/>
-              </a:ext>
-            </a:extLst>
-          </p:cNvPr>
-          <p:cNvCxnSpPr>
-            <a:cxnSpLocks/>
-            <a:stCxn id="14" idx="6"/>
-            <a:endCxn id="71" idx="1"/>
-          </p:cNvCxnSpPr>
-          <p:nvPr/>
-        </p:nvCxnSpPr>
-        <p:spPr bwMode="auto">
-          <a:xfrm>
-            <a:off x="5535315" y="3745689"/>
-            <a:ext cx="4311143" cy="935275"/>
-          </a:xfrm>
-          <a:prstGeom prst="line">
-            <a:avLst/>
-          </a:prstGeom>
-          <a:solidFill>
-            <a:schemeClr val="accent1"/>
-          </a:solidFill>
-          <a:ln w="12700" cap="flat" cmpd="sng" algn="ctr">
-            <a:solidFill>
-              <a:schemeClr val="tx1"/>
-            </a:solidFill>
-            <a:prstDash val="solid"/>
-            <a:round/>
-            <a:headEnd type="none" w="med" len="med"/>
-            <a:tailEnd type="none"/>
-          </a:ln>
-          <a:effectLst/>
-        </p:spPr>
-      </p:cxnSp>
-      <p:sp>
-        <p:nvSpPr>
-          <p:cNvPr id="14" name="Oval 13">
-            <a:extLst>
-              <a:ext uri="{FF2B5EF4-FFF2-40B4-BE49-F238E27FC236}">
-                <a16:creationId xmlns:a16="http://schemas.microsoft.com/office/drawing/2014/main" id="{05613FF1-4509-42E2-B2DB-0811B1C1FA01}"/>
+                <a16:creationId xmlns:a16="http://schemas.microsoft.com/office/drawing/2014/main" id="{3B1E2532-B049-45A8-A9FC-FCBE383C851F}"/>
               </a:ext>
             </a:extLst>
           </p:cNvPr>
           <p:cNvSpPr/>
           <p:nvPr/>
         </p:nvSpPr>
-        <p:spPr bwMode="auto">
-          <a:xfrm>
-            <a:off x="5175315" y="3565689"/>
-            <a:ext cx="360000" cy="360000"/>
-          </a:xfrm>
-          <a:prstGeom prst="ellipse">
-            <a:avLst/>
-          </a:prstGeom>
-          <a:solidFill>
-            <a:schemeClr val="accent1"/>
-          </a:solidFill>
-          <a:ln w="12700" cap="flat" cmpd="sng" algn="ctr">
-            <a:noFill/>
-            <a:prstDash val="solid"/>
-            <a:round/>
-            <a:headEnd type="none" w="med" len="med"/>
-            <a:tailEnd type="none" w="med" len="med"/>
-          </a:ln>
-          <a:effectLst/>
-        </p:spPr>
-        <p:txBody>
-          <a:bodyPr rot="0" spcFirstLastPara="0" vertOverflow="overflow" horzOverflow="overflow" vert="horz" wrap="square" lIns="72000" tIns="36000" rIns="73152" bIns="36576" numCol="1" spcCol="0" rtlCol="0" fromWordArt="0" anchor="t" anchorCtr="0" forceAA="0" compatLnSpc="1">
-            <a:prstTxWarp prst="textNoShape">
-              <a:avLst/>
-            </a:prstTxWarp>
-            <a:noAutofit/>
+        <p:spPr>
+          <a:xfrm>
+            <a:off x="471228" y="3182660"/>
+            <a:ext cx="6531006" cy="369332"/>
+          </a:xfrm>
+          <a:prstGeom prst="rect">
+            <a:avLst/>
+          </a:prstGeom>
+        </p:spPr>
+        <p:txBody>
+          <a:bodyPr wrap="square">
+            <a:spAutoFit/>
           </a:bodyPr>
           <a:lstStyle/>
           <a:p>
-            <a:pPr marL="357188" marR="0" indent="-357188" algn="l" defTabSz="914400" rtl="0" eaLnBrk="1" fontAlgn="base" latinLnBrk="0" hangingPunct="1">
-              <a:lnSpc>
-                <a:spcPct val="100000"/>
-              </a:lnSpc>
-              <a:spcBef>
-                <a:spcPts val="300"/>
-              </a:spcBef>
-              <a:spcAft>
-                <a:spcPct val="0"/>
-              </a:spcAft>
-              <a:buClrTx/>
-              <a:buSzTx/>
-              <a:buFont typeface="Ericsson Hilda" panose="00000500000000000000" pitchFamily="2" charset="0"/>
-              <a:buChar char="—"/>
-              <a:tabLst/>
-            </a:pPr>
-            <a:endParaRPr kumimoji="0" lang="en-US" sz="2000" b="0" i="0" u="none" strike="noStrike" cap="none" normalizeH="0" baseline="0" dirty="0" err="1">
-              <a:ln>
-                <a:noFill/>
-              </a:ln>
-              <a:solidFill>
-                <a:schemeClr val="bg1"/>
-              </a:solidFill>
-              <a:effectLst/>
-              <a:latin typeface="+mn-lt"/>
-            </a:endParaRPr>
-          </a:p>
-        </p:txBody>
-      </p:sp>
-      <p:cxnSp>
-        <p:nvCxnSpPr>
-          <p:cNvPr id="17" name="Straight Connector 16">
-            <a:extLst>
-              <a:ext uri="{FF2B5EF4-FFF2-40B4-BE49-F238E27FC236}">
-                <a16:creationId xmlns:a16="http://schemas.microsoft.com/office/drawing/2014/main" id="{75BD2717-CD1F-4DD0-83D5-FFA7F583E749}"/>
-              </a:ext>
-            </a:extLst>
-          </p:cNvPr>
-          <p:cNvCxnSpPr>
-            <a:cxnSpLocks/>
-            <a:stCxn id="14" idx="5"/>
-            <a:endCxn id="75" idx="0"/>
-          </p:cNvCxnSpPr>
-          <p:nvPr/>
-        </p:nvCxnSpPr>
-        <p:spPr bwMode="auto">
-          <a:xfrm>
-            <a:off x="5482594" y="3872968"/>
-            <a:ext cx="1595903" cy="2403832"/>
-          </a:xfrm>
-          <a:prstGeom prst="line">
-            <a:avLst/>
-          </a:prstGeom>
-          <a:solidFill>
-            <a:schemeClr val="accent1"/>
-          </a:solidFill>
-          <a:ln w="12700" cap="flat" cmpd="sng" algn="ctr">
-            <a:solidFill>
-              <a:schemeClr val="tx1"/>
-            </a:solidFill>
-            <a:prstDash val="solid"/>
-            <a:round/>
-            <a:headEnd type="none" w="med" len="med"/>
-            <a:tailEnd type="none"/>
-          </a:ln>
-          <a:effectLst/>
-        </p:spPr>
-      </p:cxnSp>
-      <p:cxnSp>
-        <p:nvCxnSpPr>
-          <p:cNvPr id="21" name="Straight Connector 20">
-            <a:extLst>
-              <a:ext uri="{FF2B5EF4-FFF2-40B4-BE49-F238E27FC236}">
-                <a16:creationId xmlns:a16="http://schemas.microsoft.com/office/drawing/2014/main" id="{99894FA6-94C9-4C1E-96D0-59F4CBDD08A2}"/>
-              </a:ext>
-            </a:extLst>
-          </p:cNvPr>
-          <p:cNvCxnSpPr>
-            <a:cxnSpLocks/>
-            <a:stCxn id="14" idx="1"/>
-          </p:cNvCxnSpPr>
-          <p:nvPr/>
-        </p:nvCxnSpPr>
-        <p:spPr bwMode="auto">
-          <a:xfrm flipH="1" flipV="1">
-            <a:off x="4091540" y="1764457"/>
-            <a:ext cx="1136496" cy="1853953"/>
-          </a:xfrm>
-          <a:prstGeom prst="line">
-            <a:avLst/>
-          </a:prstGeom>
-          <a:solidFill>
-            <a:schemeClr val="accent1"/>
-          </a:solidFill>
-          <a:ln w="12700" cap="flat" cmpd="sng" algn="ctr">
-            <a:solidFill>
-              <a:schemeClr val="tx1"/>
-            </a:solidFill>
-            <a:prstDash val="solid"/>
-            <a:round/>
-            <a:headEnd type="none" w="med" len="med"/>
-            <a:tailEnd type="none"/>
-          </a:ln>
-          <a:effectLst/>
-        </p:spPr>
-      </p:cxnSp>
-      <p:cxnSp>
-        <p:nvCxnSpPr>
-          <p:cNvPr id="31" name="Straight Connector 30">
-            <a:extLst>
-              <a:ext uri="{FF2B5EF4-FFF2-40B4-BE49-F238E27FC236}">
-                <a16:creationId xmlns:a16="http://schemas.microsoft.com/office/drawing/2014/main" id="{B68742DC-436B-4819-8D2B-32EFD6B9EAF0}"/>
-              </a:ext>
-            </a:extLst>
-          </p:cNvPr>
-          <p:cNvCxnSpPr>
-            <a:cxnSpLocks/>
-            <a:stCxn id="14" idx="2"/>
-          </p:cNvCxnSpPr>
-          <p:nvPr/>
-        </p:nvCxnSpPr>
-        <p:spPr bwMode="auto">
-          <a:xfrm flipH="1" flipV="1">
-            <a:off x="2169268" y="3327753"/>
-            <a:ext cx="3006047" cy="417936"/>
-          </a:xfrm>
-          <a:prstGeom prst="line">
-            <a:avLst/>
-          </a:prstGeom>
-          <a:solidFill>
-            <a:schemeClr val="accent1"/>
-          </a:solidFill>
-          <a:ln w="12700" cap="flat" cmpd="sng" algn="ctr">
-            <a:solidFill>
-              <a:schemeClr val="tx1"/>
-            </a:solidFill>
-            <a:prstDash val="solid"/>
-            <a:round/>
-            <a:headEnd type="none" w="med" len="med"/>
-            <a:tailEnd type="none"/>
-          </a:ln>
-          <a:effectLst/>
-        </p:spPr>
-      </p:cxnSp>
-      <p:cxnSp>
-        <p:nvCxnSpPr>
-          <p:cNvPr id="35" name="Straight Connector 34">
-            <a:extLst>
-              <a:ext uri="{FF2B5EF4-FFF2-40B4-BE49-F238E27FC236}">
-                <a16:creationId xmlns:a16="http://schemas.microsoft.com/office/drawing/2014/main" id="{1682734A-403B-4805-8500-D3D4EF93350D}"/>
-              </a:ext>
-            </a:extLst>
-          </p:cNvPr>
-          <p:cNvCxnSpPr>
-            <a:cxnSpLocks/>
-            <a:stCxn id="14" idx="3"/>
-          </p:cNvCxnSpPr>
-          <p:nvPr/>
-        </p:nvCxnSpPr>
-        <p:spPr bwMode="auto">
-          <a:xfrm flipH="1">
-            <a:off x="2934224" y="3872968"/>
-            <a:ext cx="2293812" cy="1881072"/>
-          </a:xfrm>
-          <a:prstGeom prst="line">
-            <a:avLst/>
-          </a:prstGeom>
-          <a:solidFill>
-            <a:schemeClr val="accent1"/>
-          </a:solidFill>
-          <a:ln w="12700" cap="flat" cmpd="sng" algn="ctr">
-            <a:solidFill>
-              <a:schemeClr val="tx1"/>
-            </a:solidFill>
-            <a:prstDash val="solid"/>
-            <a:round/>
-            <a:headEnd type="none" w="med" len="med"/>
-            <a:tailEnd type="none"/>
-          </a:ln>
-          <a:effectLst/>
-        </p:spPr>
-      </p:cxnSp>
-      <p:sp>
-        <p:nvSpPr>
-          <p:cNvPr id="53" name="TextBox 52">
-            <a:extLst>
-              <a:ext uri="{FF2B5EF4-FFF2-40B4-BE49-F238E27FC236}">
-                <a16:creationId xmlns:a16="http://schemas.microsoft.com/office/drawing/2014/main" id="{9CA58F70-0287-4E40-8FA5-57169669C38F}"/>
-              </a:ext>
-            </a:extLst>
-          </p:cNvPr>
-          <p:cNvSpPr txBox="1"/>
-          <p:nvPr/>
-        </p:nvSpPr>
-        <p:spPr bwMode="auto">
-          <a:xfrm>
-            <a:off x="5933873" y="3180944"/>
-            <a:ext cx="535022" cy="194554"/>
-          </a:xfrm>
-          <a:prstGeom prst="rect">
-            <a:avLst/>
-          </a:prstGeom>
-          <a:noFill/>
-          <a:ln w="12700">
-            <a:noFill/>
-            <a:miter lim="800000"/>
-            <a:headEnd/>
-            <a:tailEnd/>
-          </a:ln>
-        </p:spPr>
-        <p:txBody>
-          <a:bodyPr vert="horz" wrap="none" lIns="72000" tIns="36000" rIns="73152" bIns="36576" numCol="1" rtlCol="0" anchor="t" anchorCtr="0" compatLnSpc="1">
-            <a:prstTxWarp prst="textNoShape">
-              <a:avLst/>
-            </a:prstTxWarp>
-            <a:noAutofit/>
-          </a:bodyPr>
-          <a:lstStyle/>
-          <a:p>
-            <a:pPr algn="l">
-              <a:buClr>
-                <a:schemeClr val="tx1"/>
-              </a:buClr>
-            </a:pPr>
-            <a:r>
-              <a:rPr lang="zh-CN" altLang="en-US" sz="1000" dirty="0"/>
-              <a:t>单线程</a:t>
-            </a:r>
-            <a:endParaRPr lang="en-US" sz="1000" dirty="0" err="1"/>
-          </a:p>
-        </p:txBody>
-      </p:sp>
-      <p:sp>
-        <p:nvSpPr>
-          <p:cNvPr id="54" name="TextBox 53">
-            <a:extLst>
-              <a:ext uri="{FF2B5EF4-FFF2-40B4-BE49-F238E27FC236}">
-                <a16:creationId xmlns:a16="http://schemas.microsoft.com/office/drawing/2014/main" id="{D6ABE795-9407-43DC-93A0-9E677500353B}"/>
-              </a:ext>
-            </a:extLst>
-          </p:cNvPr>
-          <p:cNvSpPr txBox="1"/>
-          <p:nvPr/>
-        </p:nvSpPr>
-        <p:spPr bwMode="auto">
-          <a:xfrm>
-            <a:off x="6489133" y="2749818"/>
-            <a:ext cx="535022" cy="194554"/>
-          </a:xfrm>
-          <a:prstGeom prst="rect">
-            <a:avLst/>
-          </a:prstGeom>
-          <a:noFill/>
-          <a:ln w="12700">
-            <a:noFill/>
-            <a:miter lim="800000"/>
-            <a:headEnd/>
-            <a:tailEnd/>
-          </a:ln>
-        </p:spPr>
-        <p:txBody>
-          <a:bodyPr vert="horz" wrap="none" lIns="72000" tIns="36000" rIns="73152" bIns="36576" numCol="1" rtlCol="0" anchor="t" anchorCtr="0" compatLnSpc="1">
-            <a:prstTxWarp prst="textNoShape">
-              <a:avLst/>
-            </a:prstTxWarp>
-            <a:noAutofit/>
-          </a:bodyPr>
-          <a:lstStyle/>
-          <a:p>
-            <a:pPr algn="l">
-              <a:buClr>
-                <a:schemeClr val="tx1"/>
-              </a:buClr>
-            </a:pPr>
-            <a:r>
-              <a:rPr lang="zh-CN" altLang="en-US" sz="1000" dirty="0"/>
-              <a:t>多线程</a:t>
-            </a:r>
-            <a:endParaRPr lang="en-US" sz="1000" dirty="0" err="1"/>
-          </a:p>
-        </p:txBody>
-      </p:sp>
-      <p:sp>
-        <p:nvSpPr>
-          <p:cNvPr id="55" name="TextBox 54">
-            <a:extLst>
-              <a:ext uri="{FF2B5EF4-FFF2-40B4-BE49-F238E27FC236}">
-                <a16:creationId xmlns:a16="http://schemas.microsoft.com/office/drawing/2014/main" id="{F3F665FB-10F4-4A71-B5EC-A9BD2CF523F4}"/>
-              </a:ext>
-            </a:extLst>
-          </p:cNvPr>
-          <p:cNvSpPr txBox="1"/>
-          <p:nvPr/>
-        </p:nvSpPr>
-        <p:spPr bwMode="auto">
-          <a:xfrm>
-            <a:off x="7024155" y="2326399"/>
-            <a:ext cx="535022" cy="194554"/>
-          </a:xfrm>
-          <a:prstGeom prst="rect">
-            <a:avLst/>
-          </a:prstGeom>
-          <a:noFill/>
-          <a:ln w="12700">
-            <a:noFill/>
-            <a:miter lim="800000"/>
-            <a:headEnd/>
-            <a:tailEnd/>
-          </a:ln>
-        </p:spPr>
-        <p:txBody>
-          <a:bodyPr vert="horz" wrap="none" lIns="72000" tIns="36000" rIns="73152" bIns="36576" numCol="1" rtlCol="0" anchor="t" anchorCtr="0" compatLnSpc="1">
-            <a:prstTxWarp prst="textNoShape">
-              <a:avLst/>
-            </a:prstTxWarp>
-            <a:noAutofit/>
-          </a:bodyPr>
-          <a:lstStyle/>
-          <a:p>
-            <a:pPr algn="l">
-              <a:buClr>
-                <a:schemeClr val="tx1"/>
-              </a:buClr>
-            </a:pPr>
-            <a:r>
-              <a:rPr lang="zh-CN" altLang="en-US" sz="1000" dirty="0"/>
-              <a:t>多进程</a:t>
-            </a:r>
-            <a:endParaRPr lang="en-US" sz="1000" dirty="0" err="1"/>
-          </a:p>
-        </p:txBody>
-      </p:sp>
-      <p:sp>
-        <p:nvSpPr>
-          <p:cNvPr id="56" name="TextBox 55">
-            <a:extLst>
-              <a:ext uri="{FF2B5EF4-FFF2-40B4-BE49-F238E27FC236}">
-                <a16:creationId xmlns:a16="http://schemas.microsoft.com/office/drawing/2014/main" id="{433A44D2-468B-4CB0-95A9-D61D6391E054}"/>
-              </a:ext>
-            </a:extLst>
-          </p:cNvPr>
-          <p:cNvSpPr txBox="1"/>
-          <p:nvPr/>
-        </p:nvSpPr>
-        <p:spPr bwMode="auto">
-          <a:xfrm>
-            <a:off x="7525495" y="1927780"/>
-            <a:ext cx="535022" cy="194554"/>
-          </a:xfrm>
-          <a:prstGeom prst="rect">
-            <a:avLst/>
-          </a:prstGeom>
-          <a:noFill/>
-          <a:ln w="12700">
-            <a:noFill/>
-            <a:miter lim="800000"/>
-            <a:headEnd/>
-            <a:tailEnd/>
-          </a:ln>
-        </p:spPr>
-        <p:txBody>
-          <a:bodyPr vert="horz" wrap="none" lIns="72000" tIns="36000" rIns="73152" bIns="36576" numCol="1" rtlCol="0" anchor="t" anchorCtr="0" compatLnSpc="1">
-            <a:prstTxWarp prst="textNoShape">
-              <a:avLst/>
-            </a:prstTxWarp>
-            <a:noAutofit/>
-          </a:bodyPr>
-          <a:lstStyle/>
-          <a:p>
-            <a:pPr algn="l">
-              <a:buClr>
-                <a:schemeClr val="tx1"/>
-              </a:buClr>
-            </a:pPr>
-            <a:r>
-              <a:rPr lang="zh-CN" altLang="en-US" sz="1000" dirty="0"/>
-              <a:t>分布式</a:t>
-            </a:r>
-            <a:endParaRPr lang="en-US" sz="1000" dirty="0" err="1"/>
-          </a:p>
-        </p:txBody>
-      </p:sp>
-      <p:sp>
-        <p:nvSpPr>
-          <p:cNvPr id="57" name="TextBox 56">
-            <a:extLst>
-              <a:ext uri="{FF2B5EF4-FFF2-40B4-BE49-F238E27FC236}">
-                <a16:creationId xmlns:a16="http://schemas.microsoft.com/office/drawing/2014/main" id="{391C037D-7F3B-4DA0-AAB4-415735C5A615}"/>
-              </a:ext>
-            </a:extLst>
-          </p:cNvPr>
-          <p:cNvSpPr txBox="1"/>
-          <p:nvPr/>
-        </p:nvSpPr>
-        <p:spPr bwMode="auto">
-          <a:xfrm>
-            <a:off x="5809483" y="3913986"/>
-            <a:ext cx="535022" cy="194554"/>
-          </a:xfrm>
-          <a:prstGeom prst="rect">
-            <a:avLst/>
-          </a:prstGeom>
-          <a:noFill/>
-          <a:ln w="12700">
-            <a:noFill/>
-            <a:miter lim="800000"/>
-            <a:headEnd/>
-            <a:tailEnd/>
-          </a:ln>
-        </p:spPr>
-        <p:txBody>
-          <a:bodyPr vert="horz" wrap="none" lIns="72000" tIns="36000" rIns="73152" bIns="36576" numCol="1" rtlCol="0" anchor="t" anchorCtr="0" compatLnSpc="1">
-            <a:prstTxWarp prst="textNoShape">
-              <a:avLst/>
-            </a:prstTxWarp>
-            <a:noAutofit/>
-          </a:bodyPr>
-          <a:lstStyle/>
-          <a:p>
-            <a:pPr algn="l">
-              <a:buClr>
-                <a:schemeClr val="tx1"/>
-              </a:buClr>
-            </a:pPr>
-            <a:r>
-              <a:rPr lang="zh-CN" altLang="en-US" sz="1000" dirty="0"/>
-              <a:t>双缓冲区</a:t>
-            </a:r>
-            <a:endParaRPr lang="en-US" sz="1000" dirty="0" err="1"/>
-          </a:p>
-        </p:txBody>
-      </p:sp>
-      <p:sp>
-        <p:nvSpPr>
-          <p:cNvPr id="58" name="TextBox 57">
-            <a:extLst>
-              <a:ext uri="{FF2B5EF4-FFF2-40B4-BE49-F238E27FC236}">
-                <a16:creationId xmlns:a16="http://schemas.microsoft.com/office/drawing/2014/main" id="{3119178C-C78B-468A-B962-85CF526CB129}"/>
-              </a:ext>
-            </a:extLst>
-          </p:cNvPr>
-          <p:cNvSpPr txBox="1"/>
-          <p:nvPr/>
-        </p:nvSpPr>
-        <p:spPr bwMode="auto">
-          <a:xfrm>
-            <a:off x="6391065" y="4089746"/>
-            <a:ext cx="535022" cy="194554"/>
-          </a:xfrm>
-          <a:prstGeom prst="rect">
-            <a:avLst/>
-          </a:prstGeom>
-          <a:noFill/>
-          <a:ln w="12700">
-            <a:noFill/>
-            <a:miter lim="800000"/>
-            <a:headEnd/>
-            <a:tailEnd/>
-          </a:ln>
-        </p:spPr>
-        <p:txBody>
-          <a:bodyPr vert="horz" wrap="none" lIns="72000" tIns="36000" rIns="73152" bIns="36576" numCol="1" rtlCol="0" anchor="t" anchorCtr="0" compatLnSpc="1">
-            <a:prstTxWarp prst="textNoShape">
-              <a:avLst/>
-            </a:prstTxWarp>
-            <a:noAutofit/>
-          </a:bodyPr>
-          <a:lstStyle/>
-          <a:p>
-            <a:pPr algn="l">
-              <a:buClr>
-                <a:schemeClr val="tx1"/>
-              </a:buClr>
-            </a:pPr>
-            <a:r>
-              <a:rPr lang="zh-CN" altLang="en-US" sz="1000" dirty="0"/>
-              <a:t>队列缓冲区</a:t>
-            </a:r>
-            <a:endParaRPr lang="en-US" sz="1000" dirty="0" err="1"/>
-          </a:p>
-        </p:txBody>
-      </p:sp>
-      <p:sp>
-        <p:nvSpPr>
-          <p:cNvPr id="59" name="TextBox 58">
-            <a:extLst>
-              <a:ext uri="{FF2B5EF4-FFF2-40B4-BE49-F238E27FC236}">
-                <a16:creationId xmlns:a16="http://schemas.microsoft.com/office/drawing/2014/main" id="{B1FE9574-E129-4B92-B14F-D2DDFB0455D6}"/>
-              </a:ext>
-            </a:extLst>
-          </p:cNvPr>
-          <p:cNvSpPr txBox="1"/>
-          <p:nvPr/>
-        </p:nvSpPr>
-        <p:spPr bwMode="auto">
-          <a:xfrm>
-            <a:off x="7273157" y="4242142"/>
-            <a:ext cx="535022" cy="194554"/>
-          </a:xfrm>
-          <a:prstGeom prst="rect">
-            <a:avLst/>
-          </a:prstGeom>
-          <a:noFill/>
-          <a:ln w="12700">
-            <a:noFill/>
-            <a:miter lim="800000"/>
-            <a:headEnd/>
-            <a:tailEnd/>
-          </a:ln>
-        </p:spPr>
-        <p:txBody>
-          <a:bodyPr vert="horz" wrap="none" lIns="72000" tIns="36000" rIns="73152" bIns="36576" numCol="1" rtlCol="0" anchor="t" anchorCtr="0" compatLnSpc="1">
-            <a:prstTxWarp prst="textNoShape">
-              <a:avLst/>
-            </a:prstTxWarp>
-            <a:noAutofit/>
-          </a:bodyPr>
-          <a:lstStyle/>
-          <a:p>
-            <a:pPr algn="l">
-              <a:buClr>
-                <a:schemeClr val="tx1"/>
-              </a:buClr>
-            </a:pPr>
-            <a:r>
-              <a:rPr lang="zh-CN" altLang="en-US" sz="1000" dirty="0"/>
-              <a:t>环形数组</a:t>
-            </a:r>
-            <a:endParaRPr lang="en-US" sz="1000" dirty="0" err="1"/>
-          </a:p>
-        </p:txBody>
-      </p:sp>
-      <p:sp>
-        <p:nvSpPr>
-          <p:cNvPr id="60" name="TextBox 59">
-            <a:extLst>
-              <a:ext uri="{FF2B5EF4-FFF2-40B4-BE49-F238E27FC236}">
-                <a16:creationId xmlns:a16="http://schemas.microsoft.com/office/drawing/2014/main" id="{5FAEDE37-B06F-4CD6-BDC0-A50CE8282108}"/>
-              </a:ext>
-            </a:extLst>
-          </p:cNvPr>
-          <p:cNvSpPr txBox="1"/>
-          <p:nvPr/>
-        </p:nvSpPr>
-        <p:spPr bwMode="auto">
-          <a:xfrm>
-            <a:off x="7609168" y="4389710"/>
-            <a:ext cx="535022" cy="194554"/>
-          </a:xfrm>
-          <a:prstGeom prst="rect">
-            <a:avLst/>
-          </a:prstGeom>
-          <a:noFill/>
-          <a:ln w="12700">
-            <a:noFill/>
-            <a:miter lim="800000"/>
-            <a:headEnd/>
-            <a:tailEnd/>
-          </a:ln>
-        </p:spPr>
-        <p:txBody>
-          <a:bodyPr vert="horz" wrap="none" lIns="72000" tIns="36000" rIns="73152" bIns="36576" numCol="1" rtlCol="0" anchor="t" anchorCtr="0" compatLnSpc="1">
-            <a:prstTxWarp prst="textNoShape">
-              <a:avLst/>
-            </a:prstTxWarp>
-            <a:noAutofit/>
-          </a:bodyPr>
-          <a:lstStyle/>
-          <a:p>
-            <a:pPr algn="l">
-              <a:buClr>
-                <a:schemeClr val="tx1"/>
-              </a:buClr>
-            </a:pPr>
-            <a:r>
-              <a:rPr lang="zh-CN" altLang="en-US" sz="1000" dirty="0"/>
-              <a:t>环形链表</a:t>
-            </a:r>
-            <a:endParaRPr lang="en-US" sz="1000" dirty="0" err="1"/>
-          </a:p>
-        </p:txBody>
-      </p:sp>
-      <p:sp>
-        <p:nvSpPr>
-          <p:cNvPr id="61" name="TextBox 60">
-            <a:extLst>
-              <a:ext uri="{FF2B5EF4-FFF2-40B4-BE49-F238E27FC236}">
-                <a16:creationId xmlns:a16="http://schemas.microsoft.com/office/drawing/2014/main" id="{C3724BA7-32E2-4D23-9401-C8C42A5B5673}"/>
-              </a:ext>
-            </a:extLst>
-          </p:cNvPr>
-          <p:cNvSpPr txBox="1"/>
-          <p:nvPr/>
-        </p:nvSpPr>
-        <p:spPr bwMode="auto">
-          <a:xfrm>
-            <a:off x="5113388" y="4426344"/>
-            <a:ext cx="718790" cy="359999"/>
-          </a:xfrm>
-          <a:prstGeom prst="rect">
-            <a:avLst/>
-          </a:prstGeom>
-          <a:noFill/>
-          <a:ln w="12700">
-            <a:noFill/>
-            <a:miter lim="800000"/>
-            <a:headEnd/>
-            <a:tailEnd/>
-          </a:ln>
-        </p:spPr>
-        <p:txBody>
-          <a:bodyPr vert="horz" wrap="none" lIns="72000" tIns="36000" rIns="73152" bIns="36576" numCol="1" rtlCol="0" anchor="t" anchorCtr="0" compatLnSpc="1">
-            <a:prstTxWarp prst="textNoShape">
-              <a:avLst/>
-            </a:prstTxWarp>
-            <a:noAutofit/>
-          </a:bodyPr>
-          <a:lstStyle/>
-          <a:p>
-            <a:pPr algn="l">
-              <a:buClr>
-                <a:schemeClr val="tx1"/>
-              </a:buClr>
-            </a:pPr>
-            <a:r>
-              <a:rPr lang="zh-CN" altLang="en-US" sz="1000" dirty="0"/>
-              <a:t>单个生产者</a:t>
-            </a:r>
-            <a:endParaRPr lang="en-US" altLang="zh-CN" sz="1000" dirty="0"/>
-          </a:p>
-          <a:p>
-            <a:pPr algn="l">
-              <a:buClr>
-                <a:schemeClr val="tx1"/>
-              </a:buClr>
-            </a:pPr>
-            <a:r>
-              <a:rPr lang="zh-CN" altLang="en-US" sz="1000" dirty="0"/>
-              <a:t>单个消费者</a:t>
-            </a:r>
-            <a:endParaRPr lang="en-US" sz="1000" dirty="0" err="1"/>
-          </a:p>
-        </p:txBody>
-      </p:sp>
-      <p:sp>
-        <p:nvSpPr>
-          <p:cNvPr id="62" name="TextBox 61">
-            <a:extLst>
-              <a:ext uri="{FF2B5EF4-FFF2-40B4-BE49-F238E27FC236}">
-                <a16:creationId xmlns:a16="http://schemas.microsoft.com/office/drawing/2014/main" id="{6A5E47BF-B403-44CC-AF34-8B790CB25957}"/>
-              </a:ext>
-            </a:extLst>
-          </p:cNvPr>
-          <p:cNvSpPr txBox="1"/>
-          <p:nvPr/>
-        </p:nvSpPr>
-        <p:spPr bwMode="auto">
-          <a:xfrm>
-            <a:off x="5372487" y="4907784"/>
-            <a:ext cx="718790" cy="359999"/>
-          </a:xfrm>
-          <a:prstGeom prst="rect">
-            <a:avLst/>
-          </a:prstGeom>
-          <a:noFill/>
-          <a:ln w="12700">
-            <a:noFill/>
-            <a:miter lim="800000"/>
-            <a:headEnd/>
-            <a:tailEnd/>
-          </a:ln>
-        </p:spPr>
-        <p:txBody>
-          <a:bodyPr vert="horz" wrap="none" lIns="72000" tIns="36000" rIns="73152" bIns="36576" numCol="1" rtlCol="0" anchor="t" anchorCtr="0" compatLnSpc="1">
-            <a:prstTxWarp prst="textNoShape">
-              <a:avLst/>
-            </a:prstTxWarp>
-            <a:noAutofit/>
-          </a:bodyPr>
-          <a:lstStyle/>
-          <a:p>
-            <a:pPr algn="l">
-              <a:buClr>
-                <a:schemeClr val="tx1"/>
-              </a:buClr>
-            </a:pPr>
-            <a:r>
-              <a:rPr lang="zh-CN" altLang="en-US" sz="1000" dirty="0"/>
-              <a:t>多个生产者</a:t>
-            </a:r>
-            <a:endParaRPr lang="en-US" altLang="zh-CN" sz="1000" dirty="0"/>
-          </a:p>
-          <a:p>
-            <a:pPr algn="l">
-              <a:buClr>
-                <a:schemeClr val="tx1"/>
-              </a:buClr>
-            </a:pPr>
-            <a:r>
-              <a:rPr lang="zh-CN" altLang="en-US" sz="1000" dirty="0"/>
-              <a:t>单个消费者</a:t>
-            </a:r>
-            <a:endParaRPr lang="en-US" sz="1000" dirty="0" err="1"/>
-          </a:p>
-        </p:txBody>
-      </p:sp>
-      <p:sp>
-        <p:nvSpPr>
-          <p:cNvPr id="63" name="TextBox 62">
-            <a:extLst>
-              <a:ext uri="{FF2B5EF4-FFF2-40B4-BE49-F238E27FC236}">
-                <a16:creationId xmlns:a16="http://schemas.microsoft.com/office/drawing/2014/main" id="{6E64B5D6-F0F4-4D6D-8F61-FD55A8C5C507}"/>
-              </a:ext>
-            </a:extLst>
-          </p:cNvPr>
-          <p:cNvSpPr txBox="1"/>
-          <p:nvPr/>
-        </p:nvSpPr>
-        <p:spPr bwMode="auto">
-          <a:xfrm>
-            <a:off x="5683476" y="5350522"/>
-            <a:ext cx="718790" cy="359999"/>
-          </a:xfrm>
-          <a:prstGeom prst="rect">
-            <a:avLst/>
-          </a:prstGeom>
-          <a:noFill/>
-          <a:ln w="12700">
-            <a:noFill/>
-            <a:miter lim="800000"/>
-            <a:headEnd/>
-            <a:tailEnd/>
-          </a:ln>
-        </p:spPr>
-        <p:txBody>
-          <a:bodyPr vert="horz" wrap="none" lIns="72000" tIns="36000" rIns="73152" bIns="36576" numCol="1" rtlCol="0" anchor="t" anchorCtr="0" compatLnSpc="1">
-            <a:prstTxWarp prst="textNoShape">
-              <a:avLst/>
-            </a:prstTxWarp>
-            <a:noAutofit/>
-          </a:bodyPr>
-          <a:lstStyle/>
-          <a:p>
-            <a:pPr algn="l">
-              <a:buClr>
-                <a:schemeClr val="tx1"/>
-              </a:buClr>
-            </a:pPr>
-            <a:r>
-              <a:rPr lang="zh-CN" altLang="en-US" sz="1000" dirty="0"/>
-              <a:t>单个生产者</a:t>
-            </a:r>
-            <a:endParaRPr lang="en-US" altLang="zh-CN" sz="1000" dirty="0"/>
-          </a:p>
-          <a:p>
-            <a:pPr algn="l">
-              <a:buClr>
-                <a:schemeClr val="tx1"/>
-              </a:buClr>
-            </a:pPr>
-            <a:r>
-              <a:rPr lang="zh-CN" altLang="en-US" sz="1000" dirty="0"/>
-              <a:t>多个消费者</a:t>
-            </a:r>
-            <a:endParaRPr lang="en-US" sz="1000" dirty="0" err="1"/>
-          </a:p>
-        </p:txBody>
-      </p:sp>
-      <p:sp>
-        <p:nvSpPr>
-          <p:cNvPr id="64" name="TextBox 63">
-            <a:extLst>
-              <a:ext uri="{FF2B5EF4-FFF2-40B4-BE49-F238E27FC236}">
-                <a16:creationId xmlns:a16="http://schemas.microsoft.com/office/drawing/2014/main" id="{685C08FC-5E88-4010-9596-3F4CF4F66364}"/>
-              </a:ext>
-            </a:extLst>
-          </p:cNvPr>
-          <p:cNvSpPr txBox="1"/>
-          <p:nvPr/>
-        </p:nvSpPr>
-        <p:spPr bwMode="auto">
-          <a:xfrm>
-            <a:off x="6057306" y="5818190"/>
-            <a:ext cx="718790" cy="359999"/>
-          </a:xfrm>
-          <a:prstGeom prst="rect">
-            <a:avLst/>
-          </a:prstGeom>
-          <a:noFill/>
-          <a:ln w="12700">
-            <a:noFill/>
-            <a:miter lim="800000"/>
-            <a:headEnd/>
-            <a:tailEnd/>
-          </a:ln>
-        </p:spPr>
-        <p:txBody>
-          <a:bodyPr vert="horz" wrap="none" lIns="72000" tIns="36000" rIns="73152" bIns="36576" numCol="1" rtlCol="0" anchor="t" anchorCtr="0" compatLnSpc="1">
-            <a:prstTxWarp prst="textNoShape">
-              <a:avLst/>
-            </a:prstTxWarp>
-            <a:noAutofit/>
-          </a:bodyPr>
-          <a:lstStyle/>
-          <a:p>
-            <a:pPr algn="l">
-              <a:buClr>
-                <a:schemeClr val="tx1"/>
-              </a:buClr>
-            </a:pPr>
-            <a:r>
-              <a:rPr lang="zh-CN" altLang="en-US" sz="1000" dirty="0"/>
-              <a:t>多个生产者</a:t>
-            </a:r>
-            <a:endParaRPr lang="en-US" altLang="zh-CN" sz="1000" dirty="0"/>
-          </a:p>
-          <a:p>
-            <a:pPr algn="l">
-              <a:buClr>
-                <a:schemeClr val="tx1"/>
-              </a:buClr>
-            </a:pPr>
-            <a:r>
-              <a:rPr lang="zh-CN" altLang="en-US" sz="1000" dirty="0"/>
-              <a:t>多个消费者</a:t>
-            </a:r>
-            <a:endParaRPr lang="en-US" sz="1000" dirty="0" err="1"/>
-          </a:p>
-        </p:txBody>
-      </p:sp>
-      <p:sp>
-        <p:nvSpPr>
-          <p:cNvPr id="65" name="TextBox 64">
-            <a:extLst>
-              <a:ext uri="{FF2B5EF4-FFF2-40B4-BE49-F238E27FC236}">
-                <a16:creationId xmlns:a16="http://schemas.microsoft.com/office/drawing/2014/main" id="{33736515-1844-4107-94FA-CD1E1294BFEA}"/>
-              </a:ext>
-            </a:extLst>
-          </p:cNvPr>
-          <p:cNvSpPr txBox="1"/>
-          <p:nvPr/>
-        </p:nvSpPr>
-        <p:spPr bwMode="auto">
-          <a:xfrm>
-            <a:off x="4411445" y="4139389"/>
-            <a:ext cx="290763" cy="245083"/>
-          </a:xfrm>
-          <a:prstGeom prst="rect">
-            <a:avLst/>
-          </a:prstGeom>
-          <a:noFill/>
-          <a:ln w="12700">
-            <a:noFill/>
-            <a:miter lim="800000"/>
-            <a:headEnd/>
-            <a:tailEnd/>
-          </a:ln>
-        </p:spPr>
-        <p:txBody>
-          <a:bodyPr vert="horz" wrap="none" lIns="72000" tIns="36000" rIns="73152" bIns="36576" numCol="1" rtlCol="0" anchor="t" anchorCtr="0" compatLnSpc="1">
-            <a:prstTxWarp prst="textNoShape">
-              <a:avLst/>
-            </a:prstTxWarp>
-            <a:noAutofit/>
-          </a:bodyPr>
-          <a:lstStyle/>
-          <a:p>
-            <a:pPr algn="l">
-              <a:buClr>
-                <a:schemeClr val="tx1"/>
-              </a:buClr>
-            </a:pPr>
-            <a:r>
-              <a:rPr lang="zh-CN" altLang="en-US" sz="1000" dirty="0"/>
-              <a:t>低</a:t>
-            </a:r>
-            <a:endParaRPr lang="en-US" sz="1000" dirty="0" err="1"/>
-          </a:p>
-        </p:txBody>
-      </p:sp>
-      <p:sp>
-        <p:nvSpPr>
-          <p:cNvPr id="66" name="TextBox 65">
-            <a:extLst>
-              <a:ext uri="{FF2B5EF4-FFF2-40B4-BE49-F238E27FC236}">
-                <a16:creationId xmlns:a16="http://schemas.microsoft.com/office/drawing/2014/main" id="{4B5AB139-2157-4680-A71D-FE8E60728B31}"/>
-              </a:ext>
-            </a:extLst>
-          </p:cNvPr>
-          <p:cNvSpPr txBox="1"/>
-          <p:nvPr/>
-        </p:nvSpPr>
-        <p:spPr bwMode="auto">
-          <a:xfrm>
-            <a:off x="3074033" y="5204121"/>
-            <a:ext cx="363453" cy="262722"/>
-          </a:xfrm>
-          <a:prstGeom prst="rect">
-            <a:avLst/>
-          </a:prstGeom>
-          <a:noFill/>
-          <a:ln w="12700">
-            <a:noFill/>
-            <a:miter lim="800000"/>
-            <a:headEnd/>
-            <a:tailEnd/>
-          </a:ln>
-        </p:spPr>
-        <p:txBody>
-          <a:bodyPr vert="horz" wrap="none" lIns="72000" tIns="36000" rIns="73152" bIns="36576" numCol="1" rtlCol="0" anchor="t" anchorCtr="0" compatLnSpc="1">
-            <a:prstTxWarp prst="textNoShape">
-              <a:avLst/>
-            </a:prstTxWarp>
-            <a:noAutofit/>
-          </a:bodyPr>
-          <a:lstStyle/>
-          <a:p>
-            <a:pPr algn="l">
-              <a:buClr>
-                <a:schemeClr val="tx1"/>
-              </a:buClr>
-            </a:pPr>
-            <a:r>
-              <a:rPr lang="zh-CN" altLang="en-US" sz="1000" dirty="0"/>
-              <a:t>高</a:t>
-            </a:r>
-            <a:endParaRPr lang="en-US" sz="1000" dirty="0" err="1"/>
-          </a:p>
-        </p:txBody>
-      </p:sp>
-      <p:sp>
-        <p:nvSpPr>
-          <p:cNvPr id="67" name="TextBox 66">
-            <a:extLst>
-              <a:ext uri="{FF2B5EF4-FFF2-40B4-BE49-F238E27FC236}">
-                <a16:creationId xmlns:a16="http://schemas.microsoft.com/office/drawing/2014/main" id="{D85AB938-3D4D-4EA3-B3B3-7DFF9882A2DE}"/>
-              </a:ext>
-            </a:extLst>
-          </p:cNvPr>
-          <p:cNvSpPr txBox="1"/>
-          <p:nvPr/>
-        </p:nvSpPr>
-        <p:spPr bwMode="auto">
-          <a:xfrm>
-            <a:off x="3943510" y="3335791"/>
-            <a:ext cx="443053" cy="243966"/>
-          </a:xfrm>
-          <a:prstGeom prst="rect">
-            <a:avLst/>
-          </a:prstGeom>
-          <a:noFill/>
-          <a:ln w="12700">
-            <a:noFill/>
-            <a:miter lim="800000"/>
-            <a:headEnd/>
-            <a:tailEnd/>
-          </a:ln>
-        </p:spPr>
-        <p:txBody>
-          <a:bodyPr vert="horz" wrap="none" lIns="72000" tIns="36000" rIns="73152" bIns="36576" numCol="1" rtlCol="0" anchor="t" anchorCtr="0" compatLnSpc="1">
-            <a:prstTxWarp prst="textNoShape">
-              <a:avLst/>
-            </a:prstTxWarp>
-            <a:noAutofit/>
-          </a:bodyPr>
-          <a:lstStyle/>
-          <a:p>
-            <a:pPr algn="l">
-              <a:buClr>
-                <a:schemeClr val="tx1"/>
-              </a:buClr>
-            </a:pPr>
-            <a:r>
-              <a:rPr lang="zh-CN" altLang="en-US" sz="1000" dirty="0"/>
-              <a:t>死锁</a:t>
-            </a:r>
-            <a:endParaRPr lang="en-US" sz="1000" dirty="0" err="1"/>
-          </a:p>
-        </p:txBody>
-      </p:sp>
-      <p:sp>
-        <p:nvSpPr>
-          <p:cNvPr id="68" name="TextBox 67">
-            <a:extLst>
-              <a:ext uri="{FF2B5EF4-FFF2-40B4-BE49-F238E27FC236}">
-                <a16:creationId xmlns:a16="http://schemas.microsoft.com/office/drawing/2014/main" id="{77025002-5BD7-4710-873B-CE742C53AD34}"/>
-              </a:ext>
-            </a:extLst>
-          </p:cNvPr>
-          <p:cNvSpPr txBox="1"/>
-          <p:nvPr/>
-        </p:nvSpPr>
-        <p:spPr bwMode="auto">
-          <a:xfrm>
-            <a:off x="4785909" y="2773826"/>
-            <a:ext cx="609474" cy="262721"/>
-          </a:xfrm>
-          <a:prstGeom prst="rect">
-            <a:avLst/>
-          </a:prstGeom>
-          <a:noFill/>
-          <a:ln w="12700">
-            <a:noFill/>
-            <a:miter lim="800000"/>
-            <a:headEnd/>
-            <a:tailEnd/>
-          </a:ln>
-        </p:spPr>
-        <p:txBody>
-          <a:bodyPr vert="horz" wrap="none" lIns="72000" tIns="36000" rIns="73152" bIns="36576" numCol="1" rtlCol="0" anchor="t" anchorCtr="0" compatLnSpc="1">
-            <a:prstTxWarp prst="textNoShape">
-              <a:avLst/>
-            </a:prstTxWarp>
-            <a:noAutofit/>
-          </a:bodyPr>
-          <a:lstStyle/>
-          <a:p>
-            <a:pPr algn="l">
-              <a:buClr>
-                <a:schemeClr val="tx1"/>
-              </a:buClr>
-            </a:pPr>
-            <a:r>
-              <a:rPr lang="zh-CN" altLang="en-US" sz="1000" dirty="0"/>
-              <a:t>主动丢弃数据</a:t>
-            </a:r>
-            <a:endParaRPr lang="en-US" sz="1000" dirty="0" err="1"/>
-          </a:p>
-        </p:txBody>
-      </p:sp>
-      <p:sp>
-        <p:nvSpPr>
-          <p:cNvPr id="69" name="TextBox 68">
-            <a:extLst>
-              <a:ext uri="{FF2B5EF4-FFF2-40B4-BE49-F238E27FC236}">
-                <a16:creationId xmlns:a16="http://schemas.microsoft.com/office/drawing/2014/main" id="{43151236-1A00-4FCD-AFBD-B8350F96D55B}"/>
-              </a:ext>
-            </a:extLst>
-          </p:cNvPr>
-          <p:cNvSpPr txBox="1"/>
-          <p:nvPr/>
-        </p:nvSpPr>
-        <p:spPr bwMode="auto">
-          <a:xfrm>
-            <a:off x="4370856" y="1990110"/>
-            <a:ext cx="805893" cy="234348"/>
-          </a:xfrm>
-          <a:prstGeom prst="rect">
-            <a:avLst/>
-          </a:prstGeom>
-          <a:noFill/>
-          <a:ln w="12700">
-            <a:noFill/>
-            <a:miter lim="800000"/>
-            <a:headEnd/>
-            <a:tailEnd/>
-          </a:ln>
-        </p:spPr>
-        <p:txBody>
-          <a:bodyPr vert="horz" wrap="none" lIns="72000" tIns="36000" rIns="73152" bIns="36576" numCol="1" rtlCol="0" anchor="t" anchorCtr="0" compatLnSpc="1">
-            <a:prstTxWarp prst="textNoShape">
-              <a:avLst/>
-            </a:prstTxWarp>
-            <a:noAutofit/>
-          </a:bodyPr>
-          <a:lstStyle/>
-          <a:p>
-            <a:pPr algn="l">
-              <a:buClr>
-                <a:schemeClr val="tx1"/>
-              </a:buClr>
-            </a:pPr>
-            <a:r>
-              <a:rPr lang="zh-CN" altLang="en-US" sz="1000" dirty="0"/>
-              <a:t>不丢弃数据</a:t>
-            </a:r>
-            <a:endParaRPr lang="en-US" sz="1000" dirty="0" err="1"/>
-          </a:p>
-        </p:txBody>
-      </p:sp>
-      <p:sp>
-        <p:nvSpPr>
-          <p:cNvPr id="70" name="TextBox 69">
-            <a:extLst>
-              <a:ext uri="{FF2B5EF4-FFF2-40B4-BE49-F238E27FC236}">
-                <a16:creationId xmlns:a16="http://schemas.microsoft.com/office/drawing/2014/main" id="{8C885275-9493-4604-8D0A-F7D4C3A2FD8E}"/>
-              </a:ext>
-            </a:extLst>
-          </p:cNvPr>
-          <p:cNvSpPr txBox="1"/>
-          <p:nvPr/>
-        </p:nvSpPr>
-        <p:spPr bwMode="auto">
-          <a:xfrm>
-            <a:off x="7697733" y="1404029"/>
-            <a:ext cx="725568" cy="210759"/>
-          </a:xfrm>
-          <a:prstGeom prst="rect">
-            <a:avLst/>
-          </a:prstGeom>
-          <a:noFill/>
-          <a:ln w="12700">
-            <a:noFill/>
-            <a:miter lim="800000"/>
-            <a:headEnd/>
-            <a:tailEnd/>
-          </a:ln>
-        </p:spPr>
-        <p:txBody>
-          <a:bodyPr vert="horz" wrap="none" lIns="72000" tIns="36000" rIns="73152" bIns="36576" numCol="1" rtlCol="0" anchor="t" anchorCtr="0" compatLnSpc="1">
-            <a:prstTxWarp prst="textNoShape">
-              <a:avLst/>
-            </a:prstTxWarp>
-            <a:noAutofit/>
-          </a:bodyPr>
-          <a:lstStyle/>
-          <a:p>
-            <a:pPr algn="l">
-              <a:buClr>
-                <a:schemeClr val="tx1"/>
-              </a:buClr>
-            </a:pPr>
-            <a:r>
-              <a:rPr lang="zh-CN" altLang="en-US" sz="1200" dirty="0"/>
-              <a:t>部署方式</a:t>
-            </a:r>
-            <a:endParaRPr lang="en-US" sz="1200" dirty="0" err="1"/>
-          </a:p>
-        </p:txBody>
-      </p:sp>
-      <p:sp>
-        <p:nvSpPr>
-          <p:cNvPr id="71" name="TextBox 70">
-            <a:extLst>
-              <a:ext uri="{FF2B5EF4-FFF2-40B4-BE49-F238E27FC236}">
-                <a16:creationId xmlns:a16="http://schemas.microsoft.com/office/drawing/2014/main" id="{DA2A8D6C-BCC8-47DE-99D5-727AB40CB4F5}"/>
-              </a:ext>
-            </a:extLst>
-          </p:cNvPr>
-          <p:cNvSpPr txBox="1"/>
-          <p:nvPr/>
-        </p:nvSpPr>
-        <p:spPr bwMode="auto">
-          <a:xfrm>
-            <a:off x="9846458" y="4575584"/>
-            <a:ext cx="762672" cy="210759"/>
-          </a:xfrm>
-          <a:prstGeom prst="rect">
-            <a:avLst/>
-          </a:prstGeom>
-          <a:noFill/>
-          <a:ln w="12700">
-            <a:noFill/>
-            <a:miter lim="800000"/>
-            <a:headEnd/>
-            <a:tailEnd/>
-          </a:ln>
-        </p:spPr>
-        <p:txBody>
-          <a:bodyPr vert="horz" wrap="none" lIns="72000" tIns="36000" rIns="73152" bIns="36576" numCol="1" rtlCol="0" anchor="t" anchorCtr="0" compatLnSpc="1">
-            <a:prstTxWarp prst="textNoShape">
-              <a:avLst/>
-            </a:prstTxWarp>
-            <a:noAutofit/>
-          </a:bodyPr>
-          <a:lstStyle/>
-          <a:p>
-            <a:pPr algn="l">
-              <a:buClr>
-                <a:schemeClr val="tx1"/>
-              </a:buClr>
-            </a:pPr>
-            <a:r>
-              <a:rPr lang="zh-CN" altLang="en-US" sz="1200" dirty="0"/>
-              <a:t>耦合类型</a:t>
-            </a:r>
-            <a:endParaRPr lang="en-US" sz="1200" dirty="0" err="1"/>
-          </a:p>
-        </p:txBody>
-      </p:sp>
-      <p:sp>
-        <p:nvSpPr>
-          <p:cNvPr id="73" name="TextBox 72">
-            <a:extLst>
-              <a:ext uri="{FF2B5EF4-FFF2-40B4-BE49-F238E27FC236}">
-                <a16:creationId xmlns:a16="http://schemas.microsoft.com/office/drawing/2014/main" id="{077E8A39-EF22-4405-B7F3-FC0749480720}"/>
-              </a:ext>
-            </a:extLst>
-          </p:cNvPr>
-          <p:cNvSpPr txBox="1"/>
-          <p:nvPr/>
-        </p:nvSpPr>
-        <p:spPr bwMode="auto">
-          <a:xfrm>
-            <a:off x="8996405" y="4597381"/>
-            <a:ext cx="535022" cy="194554"/>
-          </a:xfrm>
-          <a:prstGeom prst="rect">
-            <a:avLst/>
-          </a:prstGeom>
-          <a:noFill/>
-          <a:ln w="12700">
-            <a:noFill/>
-            <a:miter lim="800000"/>
-            <a:headEnd/>
-            <a:tailEnd/>
-          </a:ln>
-        </p:spPr>
-        <p:txBody>
-          <a:bodyPr vert="horz" wrap="none" lIns="72000" tIns="36000" rIns="73152" bIns="36576" numCol="1" rtlCol="0" anchor="t" anchorCtr="0" compatLnSpc="1">
-            <a:prstTxWarp prst="textNoShape">
-              <a:avLst/>
-            </a:prstTxWarp>
-            <a:noAutofit/>
-          </a:bodyPr>
-          <a:lstStyle/>
-          <a:p>
-            <a:pPr algn="l">
-              <a:buClr>
-                <a:schemeClr val="tx1"/>
-              </a:buClr>
-            </a:pPr>
-            <a:r>
-              <a:rPr lang="en-US" sz="1000" dirty="0"/>
-              <a:t>Broker</a:t>
-            </a:r>
-          </a:p>
-        </p:txBody>
-      </p:sp>
-      <p:sp>
-        <p:nvSpPr>
-          <p:cNvPr id="75" name="TextBox 74">
-            <a:extLst>
-              <a:ext uri="{FF2B5EF4-FFF2-40B4-BE49-F238E27FC236}">
-                <a16:creationId xmlns:a16="http://schemas.microsoft.com/office/drawing/2014/main" id="{DEF97BBD-BE83-424C-B5B6-BD462EE1A830}"/>
-              </a:ext>
-            </a:extLst>
-          </p:cNvPr>
-          <p:cNvSpPr txBox="1"/>
-          <p:nvPr/>
-        </p:nvSpPr>
-        <p:spPr bwMode="auto">
-          <a:xfrm>
-            <a:off x="6489133" y="6276800"/>
-            <a:ext cx="1178727" cy="207211"/>
-          </a:xfrm>
-          <a:prstGeom prst="rect">
-            <a:avLst/>
-          </a:prstGeom>
-          <a:noFill/>
-          <a:ln w="12700">
-            <a:noFill/>
-            <a:miter lim="800000"/>
-            <a:headEnd/>
-            <a:tailEnd/>
-          </a:ln>
-        </p:spPr>
-        <p:txBody>
-          <a:bodyPr vert="horz" wrap="none" lIns="72000" tIns="36000" rIns="73152" bIns="36576" numCol="1" rtlCol="0" anchor="t" anchorCtr="0" compatLnSpc="1">
-            <a:prstTxWarp prst="textNoShape">
-              <a:avLst/>
-            </a:prstTxWarp>
-            <a:noAutofit/>
-          </a:bodyPr>
-          <a:lstStyle/>
-          <a:p>
-            <a:pPr algn="l">
-              <a:buClr>
-                <a:schemeClr val="tx1"/>
-              </a:buClr>
-            </a:pPr>
-            <a:r>
-              <a:rPr lang="zh-CN" altLang="en-US" sz="1200" dirty="0"/>
-              <a:t>生产者消费者模式</a:t>
-            </a:r>
-            <a:endParaRPr lang="en-US" sz="1200" dirty="0" err="1"/>
-          </a:p>
-        </p:txBody>
-      </p:sp>
-      <p:sp>
-        <p:nvSpPr>
-          <p:cNvPr id="78" name="TextBox 77">
-            <a:extLst>
-              <a:ext uri="{FF2B5EF4-FFF2-40B4-BE49-F238E27FC236}">
-                <a16:creationId xmlns:a16="http://schemas.microsoft.com/office/drawing/2014/main" id="{2EB50C1C-9DFC-4102-AB03-4231F8AC7933}"/>
-              </a:ext>
-            </a:extLst>
-          </p:cNvPr>
-          <p:cNvSpPr txBox="1"/>
-          <p:nvPr/>
-        </p:nvSpPr>
-        <p:spPr bwMode="auto">
-          <a:xfrm>
-            <a:off x="2487186" y="5757150"/>
-            <a:ext cx="493803" cy="262722"/>
-          </a:xfrm>
-          <a:prstGeom prst="rect">
-            <a:avLst/>
-          </a:prstGeom>
-          <a:noFill/>
-          <a:ln w="12700">
-            <a:noFill/>
-            <a:miter lim="800000"/>
-            <a:headEnd/>
-            <a:tailEnd/>
-          </a:ln>
-        </p:spPr>
-        <p:txBody>
-          <a:bodyPr vert="horz" wrap="none" lIns="72000" tIns="36000" rIns="73152" bIns="36576" numCol="1" rtlCol="0" anchor="t" anchorCtr="0" compatLnSpc="1">
-            <a:prstTxWarp prst="textNoShape">
-              <a:avLst/>
-            </a:prstTxWarp>
-            <a:noAutofit/>
-          </a:bodyPr>
-          <a:lstStyle/>
-          <a:p>
-            <a:pPr algn="l">
-              <a:buClr>
-                <a:schemeClr val="tx1"/>
-              </a:buClr>
-            </a:pPr>
-            <a:r>
-              <a:rPr lang="zh-CN" altLang="en-US" sz="1200" dirty="0"/>
-              <a:t>性能</a:t>
-            </a:r>
-            <a:endParaRPr lang="en-US" sz="1200" dirty="0" err="1"/>
-          </a:p>
-        </p:txBody>
-      </p:sp>
-      <p:sp>
-        <p:nvSpPr>
-          <p:cNvPr id="79" name="TextBox 78">
-            <a:extLst>
-              <a:ext uri="{FF2B5EF4-FFF2-40B4-BE49-F238E27FC236}">
-                <a16:creationId xmlns:a16="http://schemas.microsoft.com/office/drawing/2014/main" id="{8CA1C759-4942-463D-9660-A676C6CE8FEE}"/>
-              </a:ext>
-            </a:extLst>
-          </p:cNvPr>
-          <p:cNvSpPr txBox="1"/>
-          <p:nvPr/>
-        </p:nvSpPr>
-        <p:spPr bwMode="auto">
-          <a:xfrm>
-            <a:off x="2734088" y="3182833"/>
-            <a:ext cx="443053" cy="243966"/>
-          </a:xfrm>
-          <a:prstGeom prst="rect">
-            <a:avLst/>
-          </a:prstGeom>
-          <a:noFill/>
-          <a:ln w="12700">
-            <a:noFill/>
-            <a:miter lim="800000"/>
-            <a:headEnd/>
-            <a:tailEnd/>
-          </a:ln>
-        </p:spPr>
-        <p:txBody>
-          <a:bodyPr vert="horz" wrap="none" lIns="72000" tIns="36000" rIns="73152" bIns="36576" numCol="1" rtlCol="0" anchor="t" anchorCtr="0" compatLnSpc="1">
-            <a:prstTxWarp prst="textNoShape">
-              <a:avLst/>
-            </a:prstTxWarp>
-            <a:noAutofit/>
-          </a:bodyPr>
-          <a:lstStyle/>
-          <a:p>
-            <a:pPr algn="l">
-              <a:buClr>
-                <a:schemeClr val="tx1"/>
-              </a:buClr>
-            </a:pPr>
-            <a:r>
-              <a:rPr lang="zh-CN" altLang="en-US" sz="1000" dirty="0"/>
-              <a:t>恢复</a:t>
-            </a:r>
-            <a:endParaRPr lang="en-US" sz="1000" dirty="0" err="1"/>
-          </a:p>
-        </p:txBody>
-      </p:sp>
-      <p:sp>
-        <p:nvSpPr>
-          <p:cNvPr id="80" name="TextBox 79">
-            <a:extLst>
-              <a:ext uri="{FF2B5EF4-FFF2-40B4-BE49-F238E27FC236}">
-                <a16:creationId xmlns:a16="http://schemas.microsoft.com/office/drawing/2014/main" id="{C97D8921-A469-4B97-921A-A8B6401105F3}"/>
-              </a:ext>
-            </a:extLst>
-          </p:cNvPr>
-          <p:cNvSpPr txBox="1"/>
-          <p:nvPr/>
-        </p:nvSpPr>
-        <p:spPr bwMode="auto">
-          <a:xfrm>
-            <a:off x="3608734" y="5179841"/>
-            <a:ext cx="975241" cy="243564"/>
-          </a:xfrm>
-          <a:prstGeom prst="rect">
-            <a:avLst/>
-          </a:prstGeom>
-          <a:noFill/>
-          <a:ln w="12700">
-            <a:noFill/>
-            <a:miter lim="800000"/>
-            <a:headEnd/>
-            <a:tailEnd/>
-          </a:ln>
-        </p:spPr>
-        <p:txBody>
-          <a:bodyPr vert="horz" wrap="none" lIns="72000" tIns="36000" rIns="73152" bIns="36576" numCol="1" rtlCol="0" anchor="t" anchorCtr="0" compatLnSpc="1">
-            <a:prstTxWarp prst="textNoShape">
-              <a:avLst/>
-            </a:prstTxWarp>
-            <a:noAutofit/>
-          </a:bodyPr>
-          <a:lstStyle/>
-          <a:p>
-            <a:pPr algn="l">
-              <a:buClr>
-                <a:schemeClr val="tx1"/>
-              </a:buClr>
-            </a:pPr>
-            <a:r>
-              <a:rPr lang="zh-CN" altLang="en-US" sz="1000" dirty="0"/>
-              <a:t>消费者负载均衡</a:t>
-            </a:r>
-            <a:endParaRPr lang="en-US" sz="1000" dirty="0" err="1"/>
-          </a:p>
-        </p:txBody>
-      </p:sp>
-      <p:sp>
-        <p:nvSpPr>
-          <p:cNvPr id="81" name="TextBox 80">
-            <a:extLst>
-              <a:ext uri="{FF2B5EF4-FFF2-40B4-BE49-F238E27FC236}">
-                <a16:creationId xmlns:a16="http://schemas.microsoft.com/office/drawing/2014/main" id="{53D8B18D-C30F-486E-B302-BD8353E97E66}"/>
-              </a:ext>
-            </a:extLst>
-          </p:cNvPr>
-          <p:cNvSpPr txBox="1"/>
-          <p:nvPr/>
-        </p:nvSpPr>
-        <p:spPr bwMode="auto">
-          <a:xfrm>
-            <a:off x="1572787" y="3195052"/>
-            <a:ext cx="493803" cy="262722"/>
-          </a:xfrm>
-          <a:prstGeom prst="rect">
-            <a:avLst/>
-          </a:prstGeom>
-          <a:noFill/>
-          <a:ln w="12700">
-            <a:noFill/>
-            <a:miter lim="800000"/>
-            <a:headEnd/>
-            <a:tailEnd/>
-          </a:ln>
-        </p:spPr>
-        <p:txBody>
-          <a:bodyPr vert="horz" wrap="none" lIns="72000" tIns="36000" rIns="73152" bIns="36576" numCol="1" rtlCol="0" anchor="t" anchorCtr="0" compatLnSpc="1">
-            <a:prstTxWarp prst="textNoShape">
-              <a:avLst/>
-            </a:prstTxWarp>
-            <a:noAutofit/>
-          </a:bodyPr>
-          <a:lstStyle/>
-          <a:p>
-            <a:pPr algn="l">
-              <a:buClr>
-                <a:schemeClr val="tx1"/>
-              </a:buClr>
-            </a:pPr>
-            <a:r>
-              <a:rPr lang="zh-CN" altLang="en-US" sz="1200" dirty="0"/>
-              <a:t>可靠性</a:t>
-            </a:r>
-            <a:endParaRPr lang="en-US" sz="1200" dirty="0" err="1"/>
-          </a:p>
-        </p:txBody>
-      </p:sp>
-      <p:sp>
-        <p:nvSpPr>
-          <p:cNvPr id="82" name="TextBox 81">
-            <a:extLst>
-              <a:ext uri="{FF2B5EF4-FFF2-40B4-BE49-F238E27FC236}">
-                <a16:creationId xmlns:a16="http://schemas.microsoft.com/office/drawing/2014/main" id="{5488D278-DA1D-44FF-AFF0-DBBB7AE2925A}"/>
-              </a:ext>
-            </a:extLst>
-          </p:cNvPr>
-          <p:cNvSpPr txBox="1"/>
-          <p:nvPr/>
-        </p:nvSpPr>
-        <p:spPr bwMode="auto">
-          <a:xfrm>
-            <a:off x="3634978" y="1509408"/>
-            <a:ext cx="725568" cy="283444"/>
-          </a:xfrm>
-          <a:prstGeom prst="rect">
-            <a:avLst/>
-          </a:prstGeom>
-          <a:noFill/>
-          <a:ln w="12700">
-            <a:noFill/>
-            <a:miter lim="800000"/>
-            <a:headEnd/>
-            <a:tailEnd/>
-          </a:ln>
-        </p:spPr>
-        <p:txBody>
-          <a:bodyPr vert="horz" wrap="none" lIns="72000" tIns="36000" rIns="73152" bIns="36576" numCol="1" rtlCol="0" anchor="t" anchorCtr="0" compatLnSpc="1">
-            <a:prstTxWarp prst="textNoShape">
-              <a:avLst/>
-            </a:prstTxWarp>
-            <a:noAutofit/>
-          </a:bodyPr>
-          <a:lstStyle/>
-          <a:p>
-            <a:pPr algn="l">
-              <a:buClr>
-                <a:schemeClr val="tx1"/>
-              </a:buClr>
-            </a:pPr>
-            <a:r>
-              <a:rPr lang="zh-CN" altLang="en-US" sz="1200" dirty="0"/>
-              <a:t>数据安全</a:t>
-            </a:r>
-            <a:endParaRPr lang="en-US" sz="1200" dirty="0" err="1"/>
-          </a:p>
-        </p:txBody>
-      </p:sp>
-      <p:sp>
-        <p:nvSpPr>
-          <p:cNvPr id="83" name="TextBox 82">
-            <a:extLst>
-              <a:ext uri="{FF2B5EF4-FFF2-40B4-BE49-F238E27FC236}">
-                <a16:creationId xmlns:a16="http://schemas.microsoft.com/office/drawing/2014/main" id="{9AD1CFCF-EF50-412D-87C1-9E024A844FDC}"/>
-              </a:ext>
-            </a:extLst>
-          </p:cNvPr>
-          <p:cNvSpPr txBox="1"/>
-          <p:nvPr/>
-        </p:nvSpPr>
-        <p:spPr bwMode="auto">
-          <a:xfrm>
-            <a:off x="4115405" y="4746036"/>
-            <a:ext cx="975241" cy="205895"/>
-          </a:xfrm>
-          <a:prstGeom prst="rect">
-            <a:avLst/>
-          </a:prstGeom>
-          <a:noFill/>
-          <a:ln w="12700">
-            <a:noFill/>
-            <a:miter lim="800000"/>
-            <a:headEnd/>
-            <a:tailEnd/>
-          </a:ln>
-        </p:spPr>
-        <p:txBody>
-          <a:bodyPr vert="horz" wrap="none" lIns="72000" tIns="36000" rIns="73152" bIns="36576" numCol="1" rtlCol="0" anchor="t" anchorCtr="0" compatLnSpc="1">
-            <a:prstTxWarp prst="textNoShape">
-              <a:avLst/>
-            </a:prstTxWarp>
-            <a:noAutofit/>
-          </a:bodyPr>
-          <a:lstStyle/>
-          <a:p>
-            <a:pPr algn="l">
-              <a:buClr>
-                <a:schemeClr val="tx1"/>
-              </a:buClr>
-            </a:pPr>
-            <a:r>
-              <a:rPr lang="zh-CN" altLang="en-US" sz="1000" dirty="0"/>
-              <a:t>锁</a:t>
-            </a:r>
-            <a:r>
-              <a:rPr lang="en-US" altLang="zh-CN" sz="1000" dirty="0"/>
-              <a:t>(</a:t>
-            </a:r>
-            <a:r>
-              <a:rPr lang="zh-CN" altLang="en-US" sz="1000" dirty="0"/>
-              <a:t>临界区</a:t>
-            </a:r>
-            <a:r>
-              <a:rPr lang="en-US" altLang="zh-CN" sz="1000" dirty="0"/>
-              <a:t>)</a:t>
-            </a:r>
-            <a:r>
-              <a:rPr lang="zh-CN" altLang="en-US" sz="1000" dirty="0"/>
-              <a:t>竞争</a:t>
-            </a:r>
-            <a:endParaRPr lang="en-US" sz="1000" dirty="0" err="1"/>
-          </a:p>
-        </p:txBody>
-      </p:sp>
-      <p:sp>
-        <p:nvSpPr>
-          <p:cNvPr id="91" name="TextBox 90">
-            <a:extLst>
-              <a:ext uri="{FF2B5EF4-FFF2-40B4-BE49-F238E27FC236}">
-                <a16:creationId xmlns:a16="http://schemas.microsoft.com/office/drawing/2014/main" id="{8F04CFF9-8D6C-4F3F-85F7-FB6770E6CADB}"/>
-              </a:ext>
-            </a:extLst>
-          </p:cNvPr>
-          <p:cNvSpPr txBox="1"/>
-          <p:nvPr/>
-        </p:nvSpPr>
-        <p:spPr bwMode="auto">
-          <a:xfrm>
-            <a:off x="6140377" y="2343103"/>
-            <a:ext cx="542085" cy="243564"/>
-          </a:xfrm>
-          <a:prstGeom prst="rect">
-            <a:avLst/>
-          </a:prstGeom>
-          <a:noFill/>
-          <a:ln w="12700">
-            <a:noFill/>
-            <a:miter lim="800000"/>
-            <a:headEnd/>
-            <a:tailEnd/>
-          </a:ln>
-        </p:spPr>
-        <p:txBody>
-          <a:bodyPr vert="horz" wrap="none" lIns="72000" tIns="36000" rIns="73152" bIns="36576" numCol="1" rtlCol="0" anchor="t" anchorCtr="0" compatLnSpc="1">
-            <a:prstTxWarp prst="textNoShape">
-              <a:avLst/>
-            </a:prstTxWarp>
-            <a:noAutofit/>
-          </a:bodyPr>
-          <a:lstStyle/>
-          <a:p>
-            <a:pPr algn="l">
-              <a:buClr>
-                <a:schemeClr val="tx1"/>
-              </a:buClr>
-            </a:pPr>
-            <a:r>
-              <a:rPr lang="zh-CN" altLang="en-US" sz="1000" dirty="0"/>
-              <a:t>并发模式</a:t>
-            </a:r>
-            <a:endParaRPr lang="en-US" sz="1000" dirty="0" err="1"/>
-          </a:p>
-        </p:txBody>
-      </p:sp>
-      <p:sp>
-        <p:nvSpPr>
-          <p:cNvPr id="93" name="TextBox 92">
-            <a:extLst>
-              <a:ext uri="{FF2B5EF4-FFF2-40B4-BE49-F238E27FC236}">
-                <a16:creationId xmlns:a16="http://schemas.microsoft.com/office/drawing/2014/main" id="{F9408553-3D7E-486B-BC14-EE0A35BEF2A0}"/>
-              </a:ext>
-            </a:extLst>
-          </p:cNvPr>
-          <p:cNvSpPr txBox="1"/>
-          <p:nvPr/>
-        </p:nvSpPr>
-        <p:spPr bwMode="auto">
-          <a:xfrm>
-            <a:off x="8291065" y="4470964"/>
-            <a:ext cx="535022" cy="194554"/>
-          </a:xfrm>
-          <a:prstGeom prst="rect">
-            <a:avLst/>
-          </a:prstGeom>
-          <a:noFill/>
-          <a:ln w="12700">
-            <a:noFill/>
-            <a:miter lim="800000"/>
-            <a:headEnd/>
-            <a:tailEnd/>
-          </a:ln>
-        </p:spPr>
-        <p:txBody>
-          <a:bodyPr vert="horz" wrap="none" lIns="72000" tIns="36000" rIns="73152" bIns="36576" numCol="1" rtlCol="0" anchor="t" anchorCtr="0" compatLnSpc="1">
-            <a:prstTxWarp prst="textNoShape">
-              <a:avLst/>
-            </a:prstTxWarp>
-            <a:noAutofit/>
-          </a:bodyPr>
-          <a:lstStyle/>
-          <a:p>
-            <a:pPr algn="l">
-              <a:buClr>
-                <a:schemeClr val="tx1"/>
-              </a:buClr>
-            </a:pPr>
-            <a:r>
-              <a:rPr lang="en-US" sz="1000" dirty="0"/>
-              <a:t>IPC</a:t>
-            </a:r>
-          </a:p>
-        </p:txBody>
-      </p:sp>
-      <p:sp>
-        <p:nvSpPr>
-          <p:cNvPr id="94" name="TextBox 93">
-            <a:extLst>
-              <a:ext uri="{FF2B5EF4-FFF2-40B4-BE49-F238E27FC236}">
-                <a16:creationId xmlns:a16="http://schemas.microsoft.com/office/drawing/2014/main" id="{DB20C11E-E80C-4A89-AF5B-47B26A04BDED}"/>
-              </a:ext>
-            </a:extLst>
-          </p:cNvPr>
-          <p:cNvSpPr txBox="1"/>
-          <p:nvPr/>
-        </p:nvSpPr>
-        <p:spPr bwMode="auto">
-          <a:xfrm>
-            <a:off x="8646114" y="4535049"/>
-            <a:ext cx="535022" cy="194554"/>
-          </a:xfrm>
-          <a:prstGeom prst="rect">
-            <a:avLst/>
-          </a:prstGeom>
-          <a:noFill/>
-          <a:ln w="12700">
-            <a:noFill/>
-            <a:miter lim="800000"/>
-            <a:headEnd/>
-            <a:tailEnd/>
-          </a:ln>
-        </p:spPr>
-        <p:txBody>
-          <a:bodyPr vert="horz" wrap="none" lIns="72000" tIns="36000" rIns="73152" bIns="36576" numCol="1" rtlCol="0" anchor="t" anchorCtr="0" compatLnSpc="1">
-            <a:prstTxWarp prst="textNoShape">
-              <a:avLst/>
-            </a:prstTxWarp>
-            <a:noAutofit/>
-          </a:bodyPr>
-          <a:lstStyle/>
-          <a:p>
-            <a:pPr algn="l">
-              <a:buClr>
-                <a:schemeClr val="tx1"/>
-              </a:buClr>
-            </a:pPr>
-            <a:r>
-              <a:rPr lang="en-US" sz="1000" dirty="0"/>
-              <a:t>MQ</a:t>
-            </a:r>
-          </a:p>
-        </p:txBody>
-      </p:sp>
-      <p:sp>
-        <p:nvSpPr>
-          <p:cNvPr id="40" name="TextBox 39">
-            <a:extLst>
-              <a:ext uri="{FF2B5EF4-FFF2-40B4-BE49-F238E27FC236}">
-                <a16:creationId xmlns:a16="http://schemas.microsoft.com/office/drawing/2014/main" id="{6EF0C50B-9CB2-4487-9BCA-1E29616D24ED}"/>
-              </a:ext>
-            </a:extLst>
-          </p:cNvPr>
-          <p:cNvSpPr txBox="1"/>
-          <p:nvPr/>
-        </p:nvSpPr>
-        <p:spPr bwMode="auto">
-          <a:xfrm>
-            <a:off x="9476759" y="4686687"/>
-            <a:ext cx="535022" cy="194554"/>
-          </a:xfrm>
-          <a:prstGeom prst="rect">
-            <a:avLst/>
-          </a:prstGeom>
-          <a:noFill/>
-          <a:ln w="12700">
-            <a:noFill/>
-            <a:miter lim="800000"/>
-            <a:headEnd/>
-            <a:tailEnd/>
-          </a:ln>
-        </p:spPr>
-        <p:txBody>
-          <a:bodyPr vert="horz" wrap="none" lIns="72000" tIns="36000" rIns="73152" bIns="36576" numCol="1" rtlCol="0" anchor="t" anchorCtr="0" compatLnSpc="1">
-            <a:prstTxWarp prst="textNoShape">
-              <a:avLst/>
-            </a:prstTxWarp>
-            <a:noAutofit/>
-          </a:bodyPr>
-          <a:lstStyle/>
-          <a:p>
-            <a:pPr algn="l">
-              <a:buClr>
-                <a:schemeClr val="tx1"/>
-              </a:buClr>
-            </a:pPr>
-            <a:r>
-              <a:rPr lang="en-US" sz="1000" dirty="0"/>
-              <a:t>DB</a:t>
-            </a:r>
+            <a:r>
+              <a:rPr lang="en-US" dirty="0">
+                <a:hlinkClick r:id="rId4"/>
+              </a:rPr>
+              <a:t>https://github.com/exiaoqu/ProducerConsumerProblemInJava</a:t>
+            </a:r>
+            <a:endParaRPr lang="en-US" dirty="0"/>
           </a:p>
         </p:txBody>
       </p:sp>
     </p:spTree>
     <p:extLst>
       <p:ext uri="{BB962C8B-B14F-4D97-AF65-F5344CB8AC3E}">
-        <p14:creationId xmlns:p14="http://schemas.microsoft.com/office/powerpoint/2010/main" val="3104396419"/>
+        <p14:creationId xmlns:p14="http://schemas.microsoft.com/office/powerpoint/2010/main" val="364811790"/>
       </p:ext>
     </p:extLst>
   </p:cSld>
@@ -16236,7 +13927,7 @@
             <a:pPr lvl="1"/>
             <a:r>
               <a:rPr lang="en-US" altLang="zh-CN" dirty="0"/>
-              <a:t>NIO Non-blocking socket</a:t>
+              <a:t>NIO Non-blocking Socket Channels</a:t>
             </a:r>
           </a:p>
           <a:p>
@@ -16399,10 +14090,6 @@
           <a:p>
             <a:pPr lvl="1"/>
             <a:r>
-              <a:rPr lang="en-US" dirty="0"/>
-              <a:t> </a:t>
-            </a:r>
-            <a:r>
               <a:rPr lang="en-US" dirty="0" err="1"/>
               <a:t>Nosql</a:t>
             </a:r>
@@ -17902,12 +15589,8 @@
               </a:buClr>
             </a:pPr>
             <a:r>
-              <a:rPr lang="en-US" sz="1200" dirty="0"/>
-              <a:t>Performance, </a:t>
-            </a:r>
-            <a:r>
               <a:rPr lang="en-US" sz="1200" dirty="0" err="1"/>
-              <a:t>respone</a:t>
+              <a:t>Performance&amp;Respone</a:t>
             </a:r>
             <a:r>
               <a:rPr lang="en-US" sz="1200" dirty="0"/>
@@ -18180,7 +15863,7 @@
         </p:nvSpPr>
         <p:spPr bwMode="auto">
           <a:xfrm>
-            <a:off x="5820234" y="2326399"/>
+            <a:off x="5820234" y="2186019"/>
             <a:ext cx="542085" cy="243564"/>
           </a:xfrm>
           <a:prstGeom prst="rect">
@@ -18210,7 +15893,7 @@
             </a:pPr>
             <a:r>
               <a:rPr lang="en-US" altLang="zh-CN" sz="1000" dirty="0"/>
-              <a:t>Concurrent model</a:t>
+              <a:t>Concurrent scenario</a:t>
             </a:r>
             <a:endParaRPr lang="en-US" sz="1000" dirty="0"/>
           </a:p>
@@ -18458,6 +16141,201 @@
               <a:rPr lang="en-US" sz="1000" dirty="0"/>
               <a:t>Live-lock </a:t>
             </a:r>
+          </a:p>
+        </p:txBody>
+      </p:sp>
+      <p:cxnSp>
+        <p:nvCxnSpPr>
+          <p:cNvPr id="4" name="Straight Connector 3">
+            <a:extLst>
+              <a:ext uri="{FF2B5EF4-FFF2-40B4-BE49-F238E27FC236}">
+                <a16:creationId xmlns:a16="http://schemas.microsoft.com/office/drawing/2014/main" id="{4B01D0CF-6B24-4055-9D8D-4B5990A1FE9B}"/>
+              </a:ext>
+            </a:extLst>
+          </p:cNvPr>
+          <p:cNvCxnSpPr>
+            <a:cxnSpLocks/>
+            <a:stCxn id="14" idx="6"/>
+          </p:cNvCxnSpPr>
+          <p:nvPr/>
+        </p:nvCxnSpPr>
+        <p:spPr bwMode="auto">
+          <a:xfrm flipV="1">
+            <a:off x="5535315" y="3036547"/>
+            <a:ext cx="4393993" cy="709142"/>
+          </a:xfrm>
+          <a:prstGeom prst="line">
+            <a:avLst/>
+          </a:prstGeom>
+          <a:solidFill>
+            <a:schemeClr val="accent1"/>
+          </a:solidFill>
+          <a:ln w="12700" cap="flat" cmpd="sng" algn="ctr">
+            <a:solidFill>
+              <a:schemeClr val="tx1"/>
+            </a:solidFill>
+            <a:prstDash val="solid"/>
+            <a:round/>
+            <a:headEnd type="none" w="med" len="med"/>
+            <a:tailEnd type="none"/>
+          </a:ln>
+          <a:effectLst/>
+        </p:spPr>
+      </p:cxnSp>
+      <p:sp>
+        <p:nvSpPr>
+          <p:cNvPr id="46" name="TextBox 45">
+            <a:extLst>
+              <a:ext uri="{FF2B5EF4-FFF2-40B4-BE49-F238E27FC236}">
+                <a16:creationId xmlns:a16="http://schemas.microsoft.com/office/drawing/2014/main" id="{97B1112A-C374-4506-A002-F624B1F79952}"/>
+              </a:ext>
+            </a:extLst>
+          </p:cNvPr>
+          <p:cNvSpPr txBox="1"/>
+          <p:nvPr/>
+        </p:nvSpPr>
+        <p:spPr bwMode="auto">
+          <a:xfrm>
+            <a:off x="9993917" y="2905186"/>
+            <a:ext cx="1376916" cy="275758"/>
+          </a:xfrm>
+          <a:prstGeom prst="rect">
+            <a:avLst/>
+          </a:prstGeom>
+          <a:noFill/>
+          <a:ln w="12700">
+            <a:noFill/>
+            <a:miter lim="800000"/>
+            <a:headEnd/>
+            <a:tailEnd/>
+          </a:ln>
+        </p:spPr>
+        <p:txBody>
+          <a:bodyPr vert="horz" wrap="none" lIns="72000" tIns="36000" rIns="73152" bIns="36576" numCol="1" rtlCol="0" anchor="t" anchorCtr="0" compatLnSpc="1">
+            <a:prstTxWarp prst="textNoShape">
+              <a:avLst/>
+            </a:prstTxWarp>
+            <a:noAutofit/>
+          </a:bodyPr>
+          <a:lstStyle/>
+          <a:p>
+            <a:pPr algn="l">
+              <a:buClr>
+                <a:schemeClr val="tx1"/>
+              </a:buClr>
+            </a:pPr>
+            <a:r>
+              <a:rPr lang="en-US" sz="1200" dirty="0"/>
+              <a:t>Concurrent Pattern</a:t>
+            </a:r>
+          </a:p>
+        </p:txBody>
+      </p:sp>
+      <p:sp>
+        <p:nvSpPr>
+          <p:cNvPr id="47" name="TextBox 46">
+            <a:extLst>
+              <a:ext uri="{FF2B5EF4-FFF2-40B4-BE49-F238E27FC236}">
+                <a16:creationId xmlns:a16="http://schemas.microsoft.com/office/drawing/2014/main" id="{37683325-39E0-4689-884F-8A79A7B74CD4}"/>
+              </a:ext>
+            </a:extLst>
+          </p:cNvPr>
+          <p:cNvSpPr txBox="1"/>
+          <p:nvPr/>
+        </p:nvSpPr>
+        <p:spPr bwMode="auto">
+          <a:xfrm>
+            <a:off x="6805762" y="3489230"/>
+            <a:ext cx="1853099" cy="224944"/>
+          </a:xfrm>
+          <a:prstGeom prst="rect">
+            <a:avLst/>
+          </a:prstGeom>
+          <a:noFill/>
+          <a:ln w="12700">
+            <a:noFill/>
+            <a:miter lim="800000"/>
+            <a:headEnd/>
+            <a:tailEnd/>
+          </a:ln>
+        </p:spPr>
+        <p:txBody>
+          <a:bodyPr vert="horz" wrap="none" lIns="72000" tIns="36000" rIns="73152" bIns="36576" numCol="1" rtlCol="0" anchor="t" anchorCtr="0" compatLnSpc="1">
+            <a:prstTxWarp prst="textNoShape">
+              <a:avLst/>
+            </a:prstTxWarp>
+            <a:noAutofit/>
+          </a:bodyPr>
+          <a:lstStyle/>
+          <a:p>
+            <a:pPr algn="l">
+              <a:buClr>
+                <a:schemeClr val="tx1"/>
+              </a:buClr>
+            </a:pPr>
+            <a:r>
+              <a:rPr lang="en-US" altLang="zh-CN" sz="1000" dirty="0"/>
+              <a:t>Actor(Erlang, Scala, Java AKKA)</a:t>
+            </a:r>
+            <a:endParaRPr lang="en-US" sz="1000" dirty="0"/>
+          </a:p>
+        </p:txBody>
+      </p:sp>
+      <p:sp>
+        <p:nvSpPr>
+          <p:cNvPr id="48" name="TextBox 47">
+            <a:extLst>
+              <a:ext uri="{FF2B5EF4-FFF2-40B4-BE49-F238E27FC236}">
+                <a16:creationId xmlns:a16="http://schemas.microsoft.com/office/drawing/2014/main" id="{31078F6E-D05B-4D9D-A72E-3AA32F15F401}"/>
+              </a:ext>
+            </a:extLst>
+          </p:cNvPr>
+          <p:cNvSpPr txBox="1"/>
+          <p:nvPr/>
+        </p:nvSpPr>
+        <p:spPr bwMode="auto">
+          <a:xfrm>
+            <a:off x="8680125" y="2944372"/>
+            <a:ext cx="809596" cy="226595"/>
+          </a:xfrm>
+          <a:prstGeom prst="rect">
+            <a:avLst/>
+          </a:prstGeom>
+          <a:noFill/>
+          <a:ln w="12700">
+            <a:noFill/>
+            <a:miter lim="800000"/>
+            <a:headEnd/>
+            <a:tailEnd/>
+          </a:ln>
+        </p:spPr>
+        <p:txBody>
+          <a:bodyPr vert="horz" wrap="none" lIns="72000" tIns="36000" rIns="73152" bIns="36576" numCol="1" rtlCol="0" anchor="t" anchorCtr="0" compatLnSpc="1">
+            <a:prstTxWarp prst="textNoShape">
+              <a:avLst/>
+            </a:prstTxWarp>
+            <a:noAutofit/>
+          </a:bodyPr>
+          <a:lstStyle/>
+          <a:p>
+            <a:pPr algn="l">
+              <a:buClr>
+                <a:schemeClr val="tx1"/>
+              </a:buClr>
+            </a:pPr>
+            <a:r>
+              <a:rPr lang="en-US" altLang="zh-CN" sz="1000" dirty="0"/>
+              <a:t>CSP(</a:t>
+            </a:r>
+            <a:r>
+              <a:rPr lang="en-US" altLang="zh-CN" sz="1000" dirty="0" err="1"/>
+              <a:t>golang</a:t>
+            </a:r>
+            <a:r>
+              <a:rPr lang="en-US" altLang="zh-CN" sz="1000" dirty="0"/>
+              <a:t>)</a:t>
+            </a:r>
+            <a:endParaRPr lang="en-US" sz="1000" dirty="0"/>
           </a:p>
         </p:txBody>
       </p:sp>

</xml_diff>